<commit_message>
cleaned up some parts in the slides
</commit_message>
<xml_diff>
--- a/Resume and Cover Letter/Resume and Cover Letter workshop.pptx
+++ b/Resume and Cover Letter/Resume and Cover Letter workshop.pptx
@@ -5,10 +5,10 @@
     <p:sldMasterId id="2147483648" r:id="rId4"/>
   </p:sldMasterIdLst>
   <p:notesMasterIdLst>
-    <p:notesMasterId r:id="rId17"/>
+    <p:notesMasterId r:id="rId15"/>
   </p:notesMasterIdLst>
   <p:handoutMasterIdLst>
-    <p:handoutMasterId r:id="rId18"/>
+    <p:handoutMasterId r:id="rId16"/>
   </p:handoutMasterIdLst>
   <p:sldIdLst>
     <p:sldId id="530" r:id="rId5"/>
@@ -19,10 +19,8 @@
     <p:sldId id="549" r:id="rId10"/>
     <p:sldId id="534" r:id="rId11"/>
     <p:sldId id="551" r:id="rId12"/>
-    <p:sldId id="535" r:id="rId13"/>
-    <p:sldId id="536" r:id="rId14"/>
-    <p:sldId id="543" r:id="rId15"/>
-    <p:sldId id="544" r:id="rId16"/>
+    <p:sldId id="543" r:id="rId13"/>
+    <p:sldId id="544" r:id="rId14"/>
   </p:sldIdLst>
   <p:sldSz cx="12192000" cy="6858000"/>
   <p:notesSz cx="6858000" cy="9144000"/>
@@ -139,1237 +137,6 @@
 <p:cmAuthorLst xmlns:a="http://schemas.openxmlformats.org/drawingml/2006/main" xmlns:r="http://schemas.openxmlformats.org/officeDocument/2006/relationships" xmlns:p="http://schemas.openxmlformats.org/presentationml/2006/main">
   <p:cmAuthor id="3" name="Author" initials="A" lastIdx="0" clrIdx="2"/>
 </p:cmAuthorLst>
-</file>
-
-<file path=ppt/charts/chart1.xml><?xml version="1.0" encoding="utf-8"?>
-<c:chartSpace xmlns:c="http://schemas.openxmlformats.org/drawingml/2006/chart" xmlns:a="http://schemas.openxmlformats.org/drawingml/2006/main" xmlns:r="http://schemas.openxmlformats.org/officeDocument/2006/relationships" xmlns:c16r2="http://schemas.microsoft.com/office/drawing/2015/06/chart">
-  <c:date1904 val="0"/>
-  <c:lang val="en-US"/>
-  <c:roundedCorners val="0"/>
-  <mc:AlternateContent xmlns:mc="http://schemas.openxmlformats.org/markup-compatibility/2006">
-    <mc:Choice xmlns:c14="http://schemas.microsoft.com/office/drawing/2007/8/2/chart" Requires="c14">
-      <c14:style val="102"/>
-    </mc:Choice>
-    <mc:Fallback>
-      <c:style val="2"/>
-    </mc:Fallback>
-  </mc:AlternateContent>
-  <c:chart>
-    <c:autoTitleDeleted val="1"/>
-    <c:plotArea>
-      <c:layout/>
-      <c:barChart>
-        <c:barDir val="bar"/>
-        <c:grouping val="stacked"/>
-        <c:varyColors val="0"/>
-        <c:ser>
-          <c:idx val="0"/>
-          <c:order val="0"/>
-          <c:tx>
-            <c:strRef>
-              <c:f>Sheet1!$B$1</c:f>
-              <c:strCache>
-                <c:ptCount val="1"/>
-                <c:pt idx="0">
-                  <c:v>Series 3</c:v>
-                </c:pt>
-              </c:strCache>
-            </c:strRef>
-          </c:tx>
-          <c:spPr>
-            <a:solidFill>
-              <a:schemeClr val="accent6"/>
-            </a:solidFill>
-            <a:ln>
-              <a:noFill/>
-            </a:ln>
-            <a:effectLst/>
-          </c:spPr>
-          <c:invertIfNegative val="0"/>
-          <c:dLbls>
-            <c:spPr>
-              <a:noFill/>
-              <a:ln>
-                <a:noFill/>
-              </a:ln>
-              <a:effectLst/>
-            </c:spPr>
-            <c:txPr>
-              <a:bodyPr rot="0" spcFirstLastPara="1" vertOverflow="ellipsis" vert="horz" wrap="square" anchor="ctr" anchorCtr="1"/>
-              <a:lstStyle/>
-              <a:p>
-                <a:pPr>
-                  <a:defRPr sz="1197" b="0" i="0" u="none" strike="noStrike" kern="1200" baseline="0">
-                    <a:solidFill>
-                      <a:schemeClr val="accent3">
-                        <a:lumMod val="25000"/>
-                      </a:schemeClr>
-                    </a:solidFill>
-                    <a:latin typeface="Segoe UI Light" panose="020B0502040204020203" pitchFamily="34" charset="0"/>
-                    <a:ea typeface="+mn-ea"/>
-                    <a:cs typeface="Segoe UI Light" panose="020B0502040204020203" pitchFamily="34" charset="0"/>
-                  </a:defRPr>
-                </a:pPr>
-                <a:endParaRPr lang="en-US"/>
-              </a:p>
-            </c:txPr>
-            <c:showLegendKey val="0"/>
-            <c:showVal val="1"/>
-            <c:showCatName val="0"/>
-            <c:showSerName val="0"/>
-            <c:showPercent val="0"/>
-            <c:showBubbleSize val="0"/>
-            <c:showLeaderLines val="0"/>
-            <c:extLst>
-              <c:ext xmlns:c15="http://schemas.microsoft.com/office/drawing/2012/chart" uri="{CE6537A1-D6FC-4f65-9D91-7224C49458BB}">
-                <c15:showLeaderLines val="1"/>
-                <c15:leaderLines>
-                  <c:spPr>
-                    <a:ln w="9525">
-                      <a:solidFill>
-                        <a:schemeClr val="tx1">
-                          <a:lumMod val="35000"/>
-                          <a:lumOff val="65000"/>
-                        </a:schemeClr>
-                      </a:solidFill>
-                    </a:ln>
-                    <a:effectLst/>
-                  </c:spPr>
-                </c15:leaderLines>
-              </c:ext>
-            </c:extLst>
-          </c:dLbls>
-          <c:cat>
-            <c:strRef>
-              <c:f>Sheet1!$A$2:$A$5</c:f>
-              <c:strCache>
-                <c:ptCount val="4"/>
-                <c:pt idx="0">
-                  <c:v>Q4</c:v>
-                </c:pt>
-                <c:pt idx="1">
-                  <c:v>Q3</c:v>
-                </c:pt>
-                <c:pt idx="2">
-                  <c:v>Q2</c:v>
-                </c:pt>
-                <c:pt idx="3">
-                  <c:v>Q1</c:v>
-                </c:pt>
-              </c:strCache>
-            </c:strRef>
-          </c:cat>
-          <c:val>
-            <c:numRef>
-              <c:f>Sheet1!$B$2:$B$5</c:f>
-              <c:numCache>
-                <c:formatCode>_(* #,##0.0_);_(* \(#,##0.0\);_(* "-"??_);_(@_)</c:formatCode>
-                <c:ptCount val="4"/>
-                <c:pt idx="0">
-                  <c:v>4.5</c:v>
-                </c:pt>
-                <c:pt idx="1">
-                  <c:v>3.5</c:v>
-                </c:pt>
-                <c:pt idx="2">
-                  <c:v>2.5</c:v>
-                </c:pt>
-                <c:pt idx="3">
-                  <c:v>4.3</c:v>
-                </c:pt>
-              </c:numCache>
-            </c:numRef>
-          </c:val>
-          <c:extLst>
-            <c:ext xmlns:c16="http://schemas.microsoft.com/office/drawing/2014/chart" uri="{C3380CC4-5D6E-409C-BE32-E72D297353CC}">
-              <c16:uniqueId val="{00000000-448A-482A-987B-70234277E2E8}"/>
-            </c:ext>
-          </c:extLst>
-        </c:ser>
-        <c:ser>
-          <c:idx val="1"/>
-          <c:order val="1"/>
-          <c:tx>
-            <c:strRef>
-              <c:f>Sheet1!$C$1</c:f>
-              <c:strCache>
-                <c:ptCount val="1"/>
-                <c:pt idx="0">
-                  <c:v>Series 2</c:v>
-                </c:pt>
-              </c:strCache>
-            </c:strRef>
-          </c:tx>
-          <c:spPr>
-            <a:solidFill>
-              <a:schemeClr val="accent4"/>
-            </a:solidFill>
-            <a:ln>
-              <a:noFill/>
-            </a:ln>
-            <a:effectLst/>
-          </c:spPr>
-          <c:invertIfNegative val="0"/>
-          <c:dLbls>
-            <c:spPr>
-              <a:noFill/>
-              <a:ln>
-                <a:noFill/>
-              </a:ln>
-              <a:effectLst/>
-            </c:spPr>
-            <c:txPr>
-              <a:bodyPr rot="0" spcFirstLastPara="1" vertOverflow="ellipsis" vert="horz" wrap="square" anchor="ctr" anchorCtr="1"/>
-              <a:lstStyle/>
-              <a:p>
-                <a:pPr>
-                  <a:defRPr sz="1197" b="0" i="0" u="none" strike="noStrike" kern="1200" baseline="0">
-                    <a:solidFill>
-                      <a:schemeClr val="accent3">
-                        <a:lumMod val="25000"/>
-                      </a:schemeClr>
-                    </a:solidFill>
-                    <a:latin typeface="Segoe UI Light" panose="020B0502040204020203" pitchFamily="34" charset="0"/>
-                    <a:ea typeface="+mn-ea"/>
-                    <a:cs typeface="Segoe UI Light" panose="020B0502040204020203" pitchFamily="34" charset="0"/>
-                  </a:defRPr>
-                </a:pPr>
-                <a:endParaRPr lang="en-US"/>
-              </a:p>
-            </c:txPr>
-            <c:showLegendKey val="0"/>
-            <c:showVal val="1"/>
-            <c:showCatName val="0"/>
-            <c:showSerName val="0"/>
-            <c:showPercent val="0"/>
-            <c:showBubbleSize val="0"/>
-            <c:showLeaderLines val="0"/>
-            <c:extLst>
-              <c:ext xmlns:c15="http://schemas.microsoft.com/office/drawing/2012/chart" uri="{CE6537A1-D6FC-4f65-9D91-7224C49458BB}">
-                <c15:showLeaderLines val="1"/>
-                <c15:leaderLines>
-                  <c:spPr>
-                    <a:ln w="9525">
-                      <a:solidFill>
-                        <a:schemeClr val="tx1">
-                          <a:lumMod val="35000"/>
-                          <a:lumOff val="65000"/>
-                        </a:schemeClr>
-                      </a:solidFill>
-                    </a:ln>
-                    <a:effectLst/>
-                  </c:spPr>
-                </c15:leaderLines>
-              </c:ext>
-            </c:extLst>
-          </c:dLbls>
-          <c:cat>
-            <c:strRef>
-              <c:f>Sheet1!$A$2:$A$5</c:f>
-              <c:strCache>
-                <c:ptCount val="4"/>
-                <c:pt idx="0">
-                  <c:v>Q4</c:v>
-                </c:pt>
-                <c:pt idx="1">
-                  <c:v>Q3</c:v>
-                </c:pt>
-                <c:pt idx="2">
-                  <c:v>Q2</c:v>
-                </c:pt>
-                <c:pt idx="3">
-                  <c:v>Q1</c:v>
-                </c:pt>
-              </c:strCache>
-            </c:strRef>
-          </c:cat>
-          <c:val>
-            <c:numRef>
-              <c:f>Sheet1!$C$2:$C$5</c:f>
-              <c:numCache>
-                <c:formatCode>_(* #,##0.0_);_(* \(#,##0.0\);_(* "-"??_);_(@_)</c:formatCode>
-                <c:ptCount val="4"/>
-                <c:pt idx="0">
-                  <c:v>2.8</c:v>
-                </c:pt>
-                <c:pt idx="1">
-                  <c:v>1.8</c:v>
-                </c:pt>
-                <c:pt idx="2">
-                  <c:v>4.4000000000000004</c:v>
-                </c:pt>
-                <c:pt idx="3">
-                  <c:v>2.4</c:v>
-                </c:pt>
-              </c:numCache>
-            </c:numRef>
-          </c:val>
-          <c:extLst>
-            <c:ext xmlns:c16="http://schemas.microsoft.com/office/drawing/2014/chart" uri="{C3380CC4-5D6E-409C-BE32-E72D297353CC}">
-              <c16:uniqueId val="{00000001-448A-482A-987B-70234277E2E8}"/>
-            </c:ext>
-          </c:extLst>
-        </c:ser>
-        <c:ser>
-          <c:idx val="2"/>
-          <c:order val="2"/>
-          <c:tx>
-            <c:strRef>
-              <c:f>Sheet1!$D$1</c:f>
-              <c:strCache>
-                <c:ptCount val="1"/>
-                <c:pt idx="0">
-                  <c:v>Series 1</c:v>
-                </c:pt>
-              </c:strCache>
-            </c:strRef>
-          </c:tx>
-          <c:spPr>
-            <a:solidFill>
-              <a:schemeClr val="tx2"/>
-            </a:solidFill>
-            <a:ln>
-              <a:noFill/>
-            </a:ln>
-            <a:effectLst/>
-          </c:spPr>
-          <c:invertIfNegative val="0"/>
-          <c:dLbls>
-            <c:spPr>
-              <a:noFill/>
-              <a:ln>
-                <a:noFill/>
-              </a:ln>
-              <a:effectLst/>
-            </c:spPr>
-            <c:txPr>
-              <a:bodyPr rot="0" spcFirstLastPara="1" vertOverflow="ellipsis" vert="horz" wrap="square" anchor="ctr" anchorCtr="1"/>
-              <a:lstStyle/>
-              <a:p>
-                <a:pPr>
-                  <a:defRPr sz="1197" b="0" i="0" u="none" strike="noStrike" kern="1200" baseline="0">
-                    <a:solidFill>
-                      <a:schemeClr val="accent3">
-                        <a:lumMod val="25000"/>
-                      </a:schemeClr>
-                    </a:solidFill>
-                    <a:latin typeface="Segoe UI Light" panose="020B0502040204020203" pitchFamily="34" charset="0"/>
-                    <a:ea typeface="+mn-ea"/>
-                    <a:cs typeface="Segoe UI Light" panose="020B0502040204020203" pitchFamily="34" charset="0"/>
-                  </a:defRPr>
-                </a:pPr>
-                <a:endParaRPr lang="en-US"/>
-              </a:p>
-            </c:txPr>
-            <c:showLegendKey val="0"/>
-            <c:showVal val="1"/>
-            <c:showCatName val="0"/>
-            <c:showSerName val="0"/>
-            <c:showPercent val="0"/>
-            <c:showBubbleSize val="0"/>
-            <c:showLeaderLines val="0"/>
-            <c:extLst>
-              <c:ext xmlns:c15="http://schemas.microsoft.com/office/drawing/2012/chart" uri="{CE6537A1-D6FC-4f65-9D91-7224C49458BB}">
-                <c15:showLeaderLines val="1"/>
-                <c15:leaderLines>
-                  <c:spPr>
-                    <a:ln w="9525">
-                      <a:solidFill>
-                        <a:schemeClr val="tx1">
-                          <a:lumMod val="35000"/>
-                          <a:lumOff val="65000"/>
-                        </a:schemeClr>
-                      </a:solidFill>
-                    </a:ln>
-                    <a:effectLst/>
-                  </c:spPr>
-                </c15:leaderLines>
-              </c:ext>
-            </c:extLst>
-          </c:dLbls>
-          <c:cat>
-            <c:strRef>
-              <c:f>Sheet1!$A$2:$A$5</c:f>
-              <c:strCache>
-                <c:ptCount val="4"/>
-                <c:pt idx="0">
-                  <c:v>Q4</c:v>
-                </c:pt>
-                <c:pt idx="1">
-                  <c:v>Q3</c:v>
-                </c:pt>
-                <c:pt idx="2">
-                  <c:v>Q2</c:v>
-                </c:pt>
-                <c:pt idx="3">
-                  <c:v>Q1</c:v>
-                </c:pt>
-              </c:strCache>
-            </c:strRef>
-          </c:cat>
-          <c:val>
-            <c:numRef>
-              <c:f>Sheet1!$D$2:$D$5</c:f>
-              <c:numCache>
-                <c:formatCode>_(* #,##0.0_);_(* \(#,##0.0\);_(* "-"??_);_(@_)</c:formatCode>
-                <c:ptCount val="4"/>
-                <c:pt idx="0">
-                  <c:v>5</c:v>
-                </c:pt>
-                <c:pt idx="1">
-                  <c:v>3</c:v>
-                </c:pt>
-                <c:pt idx="2">
-                  <c:v>2</c:v>
-                </c:pt>
-                <c:pt idx="3">
-                  <c:v>2</c:v>
-                </c:pt>
-              </c:numCache>
-            </c:numRef>
-          </c:val>
-          <c:extLst>
-            <c:ext xmlns:c16="http://schemas.microsoft.com/office/drawing/2014/chart" uri="{C3380CC4-5D6E-409C-BE32-E72D297353CC}">
-              <c16:uniqueId val="{00000002-448A-482A-987B-70234277E2E8}"/>
-            </c:ext>
-          </c:extLst>
-        </c:ser>
-        <c:dLbls>
-          <c:showLegendKey val="0"/>
-          <c:showVal val="1"/>
-          <c:showCatName val="0"/>
-          <c:showSerName val="0"/>
-          <c:showPercent val="0"/>
-          <c:showBubbleSize val="0"/>
-        </c:dLbls>
-        <c:gapWidth val="326"/>
-        <c:overlap val="100"/>
-        <c:axId val="1111705064"/>
-        <c:axId val="1111706704"/>
-      </c:barChart>
-      <c:catAx>
-        <c:axId val="1111705064"/>
-        <c:scaling>
-          <c:orientation val="minMax"/>
-        </c:scaling>
-        <c:delete val="0"/>
-        <c:axPos val="l"/>
-        <c:numFmt formatCode="General" sourceLinked="1"/>
-        <c:majorTickMark val="none"/>
-        <c:minorTickMark val="none"/>
-        <c:tickLblPos val="nextTo"/>
-        <c:spPr>
-          <a:noFill/>
-          <a:ln w="19050" cap="flat" cmpd="sng" algn="ctr">
-            <a:solidFill>
-              <a:schemeClr val="tx1">
-                <a:lumMod val="15000"/>
-                <a:lumOff val="85000"/>
-              </a:schemeClr>
-            </a:solidFill>
-            <a:round/>
-            <a:headEnd type="none" w="sm" len="sm"/>
-            <a:tailEnd type="none" w="sm" len="sm"/>
-          </a:ln>
-          <a:effectLst/>
-        </c:spPr>
-        <c:txPr>
-          <a:bodyPr rot="-60000000" spcFirstLastPara="1" vertOverflow="ellipsis" vert="horz" wrap="square" anchor="ctr" anchorCtr="1"/>
-          <a:lstStyle/>
-          <a:p>
-            <a:pPr>
-              <a:defRPr sz="1197" b="0" i="0" u="none" strike="noStrike" kern="1200" baseline="0">
-                <a:solidFill>
-                  <a:schemeClr val="bg1"/>
-                </a:solidFill>
-                <a:latin typeface="Segoe UI Light" panose="020B0502040204020203" pitchFamily="34" charset="0"/>
-                <a:ea typeface="+mn-ea"/>
-                <a:cs typeface="Segoe UI Light" panose="020B0502040204020203" pitchFamily="34" charset="0"/>
-              </a:defRPr>
-            </a:pPr>
-            <a:endParaRPr lang="en-US"/>
-          </a:p>
-        </c:txPr>
-        <c:crossAx val="1111706704"/>
-        <c:crosses val="autoZero"/>
-        <c:auto val="1"/>
-        <c:lblAlgn val="ctr"/>
-        <c:lblOffset val="100"/>
-        <c:noMultiLvlLbl val="0"/>
-      </c:catAx>
-      <c:valAx>
-        <c:axId val="1111706704"/>
-        <c:scaling>
-          <c:orientation val="minMax"/>
-        </c:scaling>
-        <c:delete val="0"/>
-        <c:axPos val="b"/>
-        <c:majorGridlines>
-          <c:spPr>
-            <a:ln w="9525" cap="flat" cmpd="sng" algn="ctr">
-              <a:gradFill>
-                <a:gsLst>
-                  <a:gs pos="99000">
-                    <a:schemeClr val="tx1">
-                      <a:lumMod val="25000"/>
-                      <a:lumOff val="75000"/>
-                    </a:schemeClr>
-                  </a:gs>
-                  <a:gs pos="0">
-                    <a:schemeClr val="tx1">
-                      <a:lumMod val="15000"/>
-                      <a:lumOff val="85000"/>
-                    </a:schemeClr>
-                  </a:gs>
-                </a:gsLst>
-                <a:lin ang="5400000" scaled="0"/>
-              </a:gradFill>
-              <a:round/>
-            </a:ln>
-            <a:effectLst/>
-          </c:spPr>
-        </c:majorGridlines>
-        <c:numFmt formatCode="_(* #,##0.0_);_(* \(#,##0.0\);_(* &quot;-&quot;??_);_(@_)" sourceLinked="1"/>
-        <c:majorTickMark val="none"/>
-        <c:minorTickMark val="none"/>
-        <c:tickLblPos val="nextTo"/>
-        <c:spPr>
-          <a:noFill/>
-          <a:ln>
-            <a:noFill/>
-          </a:ln>
-          <a:effectLst/>
-        </c:spPr>
-        <c:txPr>
-          <a:bodyPr rot="-60000000" spcFirstLastPara="1" vertOverflow="ellipsis" vert="horz" wrap="square" anchor="ctr" anchorCtr="1"/>
-          <a:lstStyle/>
-          <a:p>
-            <a:pPr>
-              <a:defRPr sz="1197" b="0" i="0" u="none" strike="noStrike" kern="1200" baseline="0">
-                <a:solidFill>
-                  <a:schemeClr val="bg1"/>
-                </a:solidFill>
-                <a:latin typeface="Segoe UI Light" panose="020B0502040204020203" pitchFamily="34" charset="0"/>
-                <a:ea typeface="+mn-ea"/>
-                <a:cs typeface="Segoe UI Light" panose="020B0502040204020203" pitchFamily="34" charset="0"/>
-              </a:defRPr>
-            </a:pPr>
-            <a:endParaRPr lang="en-US"/>
-          </a:p>
-        </c:txPr>
-        <c:crossAx val="1111705064"/>
-        <c:crosses val="autoZero"/>
-        <c:crossBetween val="between"/>
-      </c:valAx>
-      <c:spPr>
-        <a:noFill/>
-        <a:ln>
-          <a:noFill/>
-        </a:ln>
-        <a:effectLst/>
-      </c:spPr>
-    </c:plotArea>
-    <c:legend>
-      <c:legendPos val="b"/>
-      <c:overlay val="0"/>
-      <c:spPr>
-        <a:noFill/>
-        <a:ln>
-          <a:noFill/>
-        </a:ln>
-        <a:effectLst/>
-      </c:spPr>
-      <c:txPr>
-        <a:bodyPr rot="0" spcFirstLastPara="1" vertOverflow="ellipsis" vert="horz" wrap="square" anchor="ctr" anchorCtr="1"/>
-        <a:lstStyle/>
-        <a:p>
-          <a:pPr>
-            <a:defRPr sz="1197" b="0" i="0" u="none" strike="noStrike" kern="1200" baseline="0">
-              <a:solidFill>
-                <a:schemeClr val="bg1"/>
-              </a:solidFill>
-              <a:latin typeface="Segoe UI Light" panose="020B0502040204020203" pitchFamily="34" charset="0"/>
-              <a:ea typeface="+mn-ea"/>
-              <a:cs typeface="Segoe UI Light" panose="020B0502040204020203" pitchFamily="34" charset="0"/>
-            </a:defRPr>
-          </a:pPr>
-          <a:endParaRPr lang="en-US"/>
-        </a:p>
-      </c:txPr>
-    </c:legend>
-    <c:plotVisOnly val="1"/>
-    <c:dispBlanksAs val="gap"/>
-    <c:extLst>
-      <c:ext xmlns:c16r3="http://schemas.microsoft.com/office/drawing/2017/03/chart" uri="{56B9EC1D-385E-4148-901F-78D8002777C0}">
-        <c16r3:dataDisplayOptions16>
-          <c16r3:dispNaAsBlank val="1"/>
-        </c16r3:dataDisplayOptions16>
-      </c:ext>
-    </c:extLst>
-    <c:showDLblsOverMax val="0"/>
-  </c:chart>
-  <c:spPr>
-    <a:noFill/>
-    <a:ln>
-      <a:noFill/>
-    </a:ln>
-    <a:effectLst/>
-  </c:spPr>
-  <c:txPr>
-    <a:bodyPr/>
-    <a:lstStyle/>
-    <a:p>
-      <a:pPr>
-        <a:defRPr b="0" i="0">
-          <a:solidFill>
-            <a:schemeClr val="bg1"/>
-          </a:solidFill>
-          <a:latin typeface="Segoe UI Light" panose="020B0502040204020203" pitchFamily="34" charset="0"/>
-          <a:cs typeface="Segoe UI Light" panose="020B0502040204020203" pitchFamily="34" charset="0"/>
-        </a:defRPr>
-      </a:pPr>
-      <a:endParaRPr lang="en-US"/>
-    </a:p>
-  </c:txPr>
-  <c:externalData r:id="rId3">
-    <c:autoUpdate val="0"/>
-  </c:externalData>
-</c:chartSpace>
-</file>
-
-<file path=ppt/charts/colors1.xml><?xml version="1.0" encoding="utf-8"?>
-<cs:colorStyle xmlns:cs="http://schemas.microsoft.com/office/drawing/2012/chartStyle" xmlns:a="http://schemas.openxmlformats.org/drawingml/2006/main" meth="cycle" id="10">
-  <a:schemeClr val="accent1"/>
-  <a:schemeClr val="accent2"/>
-  <a:schemeClr val="accent3"/>
-  <a:schemeClr val="accent4"/>
-  <a:schemeClr val="accent5"/>
-  <a:schemeClr val="accent6"/>
-  <cs:variation/>
-  <cs:variation>
-    <a:lumMod val="60000"/>
-  </cs:variation>
-  <cs:variation>
-    <a:lumMod val="80000"/>
-    <a:lumOff val="20000"/>
-  </cs:variation>
-  <cs:variation>
-    <a:lumMod val="80000"/>
-  </cs:variation>
-  <cs:variation>
-    <a:lumMod val="60000"/>
-    <a:lumOff val="40000"/>
-  </cs:variation>
-  <cs:variation>
-    <a:lumMod val="50000"/>
-  </cs:variation>
-  <cs:variation>
-    <a:lumMod val="70000"/>
-    <a:lumOff val="30000"/>
-  </cs:variation>
-  <cs:variation>
-    <a:lumMod val="70000"/>
-  </cs:variation>
-  <cs:variation>
-    <a:lumMod val="50000"/>
-    <a:lumOff val="50000"/>
-  </cs:variation>
-</cs:colorStyle>
-</file>
-
-<file path=ppt/charts/style1.xml><?xml version="1.0" encoding="utf-8"?>
-<cs:chartStyle xmlns:cs="http://schemas.microsoft.com/office/drawing/2012/chartStyle" xmlns:a="http://schemas.openxmlformats.org/drawingml/2006/main" id="223">
-  <cs:axisTitle>
-    <cs:lnRef idx="0"/>
-    <cs:fillRef idx="0"/>
-    <cs:effectRef idx="0"/>
-    <cs:fontRef idx="minor">
-      <a:schemeClr val="tx1">
-        <a:lumMod val="65000"/>
-        <a:lumOff val="35000"/>
-      </a:schemeClr>
-    </cs:fontRef>
-    <cs:defRPr sz="1197" kern="1200" cap="all"/>
-  </cs:axisTitle>
-  <cs:categoryAxis>
-    <cs:lnRef idx="0"/>
-    <cs:fillRef idx="0"/>
-    <cs:effectRef idx="0"/>
-    <cs:fontRef idx="minor">
-      <a:schemeClr val="tx1">
-        <a:lumMod val="65000"/>
-        <a:lumOff val="35000"/>
-      </a:schemeClr>
-    </cs:fontRef>
-    <cs:spPr>
-      <a:ln w="19050" cap="flat" cmpd="sng" algn="ctr">
-        <a:solidFill>
-          <a:schemeClr val="tx1">
-            <a:lumMod val="15000"/>
-            <a:lumOff val="85000"/>
-          </a:schemeClr>
-        </a:solidFill>
-        <a:round/>
-        <a:headEnd type="none" w="sm" len="sm"/>
-        <a:tailEnd type="none" w="sm" len="sm"/>
-      </a:ln>
-    </cs:spPr>
-    <cs:defRPr sz="1197" kern="1200"/>
-  </cs:categoryAxis>
-  <cs:chartArea mods="allowNoFillOverride allowNoLineOverride">
-    <cs:lnRef idx="0"/>
-    <cs:fillRef idx="0"/>
-    <cs:effectRef idx="0"/>
-    <cs:fontRef idx="minor">
-      <a:schemeClr val="dk1"/>
-    </cs:fontRef>
-    <cs:spPr>
-      <a:solidFill>
-        <a:schemeClr val="bg1"/>
-      </a:solidFill>
-      <a:ln w="9525" cap="flat" cmpd="sng" algn="ctr">
-        <a:solidFill>
-          <a:schemeClr val="tx1">
-            <a:lumMod val="15000"/>
-            <a:lumOff val="85000"/>
-          </a:schemeClr>
-        </a:solidFill>
-        <a:round/>
-      </a:ln>
-    </cs:spPr>
-    <cs:defRPr sz="1197" kern="1200"/>
-  </cs:chartArea>
-  <cs:dataLabel>
-    <cs:lnRef idx="0"/>
-    <cs:fillRef idx="0"/>
-    <cs:effectRef idx="0"/>
-    <cs:fontRef idx="minor">
-      <a:schemeClr val="tx1">
-        <a:lumMod val="75000"/>
-        <a:lumOff val="25000"/>
-      </a:schemeClr>
-    </cs:fontRef>
-    <cs:defRPr sz="1197" kern="1200"/>
-  </cs:dataLabel>
-  <cs:dataLabelCallout>
-    <cs:lnRef idx="0"/>
-    <cs:fillRef idx="0"/>
-    <cs:effectRef idx="0"/>
-    <cs:fontRef idx="minor">
-      <a:schemeClr val="bg1"/>
-    </cs:fontRef>
-    <cs:spPr>
-      <a:solidFill>
-        <a:schemeClr val="tx1">
-          <a:lumMod val="50000"/>
-          <a:lumOff val="50000"/>
-        </a:schemeClr>
-      </a:solidFill>
-    </cs:spPr>
-    <cs:defRPr sz="1197" kern="1200"/>
-    <cs:bodyPr rot="0" spcFirstLastPara="1" vertOverflow="clip" horzOverflow="clip" vert="horz" wrap="square" lIns="36576" tIns="18288" rIns="36576" bIns="18288" anchor="ctr" anchorCtr="1">
-      <a:spAutoFit/>
-    </cs:bodyPr>
-  </cs:dataLabelCallout>
-  <cs:dataPoint>
-    <cs:lnRef idx="0"/>
-    <cs:fillRef idx="0">
-      <cs:styleClr val="auto"/>
-    </cs:fillRef>
-    <cs:effectRef idx="0"/>
-    <cs:fontRef idx="minor">
-      <a:schemeClr val="dk1"/>
-    </cs:fontRef>
-    <cs:spPr>
-      <a:gradFill flip="none" rotWithShape="1">
-        <a:gsLst>
-          <a:gs pos="0">
-            <a:schemeClr val="phClr"/>
-          </a:gs>
-          <a:gs pos="75000">
-            <a:schemeClr val="phClr">
-              <a:lumMod val="60000"/>
-              <a:lumOff val="40000"/>
-            </a:schemeClr>
-          </a:gs>
-          <a:gs pos="51000">
-            <a:schemeClr val="phClr">
-              <a:alpha val="75000"/>
-            </a:schemeClr>
-          </a:gs>
-          <a:gs pos="100000">
-            <a:schemeClr val="phClr">
-              <a:lumMod val="20000"/>
-              <a:lumOff val="80000"/>
-              <a:alpha val="15000"/>
-            </a:schemeClr>
-          </a:gs>
-        </a:gsLst>
-        <a:lin ang="10800000" scaled="1"/>
-        <a:tileRect/>
-      </a:gradFill>
-    </cs:spPr>
-  </cs:dataPoint>
-  <cs:dataPoint3D>
-    <cs:lnRef idx="0"/>
-    <cs:fillRef idx="0">
-      <cs:styleClr val="auto"/>
-    </cs:fillRef>
-    <cs:effectRef idx="0"/>
-    <cs:fontRef idx="minor">
-      <a:schemeClr val="dk1"/>
-    </cs:fontRef>
-    <cs:spPr>
-      <a:gradFill flip="none" rotWithShape="1">
-        <a:gsLst>
-          <a:gs pos="0">
-            <a:schemeClr val="phClr"/>
-          </a:gs>
-          <a:gs pos="75000">
-            <a:schemeClr val="phClr">
-              <a:lumMod val="60000"/>
-              <a:lumOff val="40000"/>
-            </a:schemeClr>
-          </a:gs>
-          <a:gs pos="51000">
-            <a:schemeClr val="phClr">
-              <a:alpha val="75000"/>
-            </a:schemeClr>
-          </a:gs>
-          <a:gs pos="100000">
-            <a:schemeClr val="phClr">
-              <a:lumMod val="20000"/>
-              <a:lumOff val="80000"/>
-              <a:alpha val="15000"/>
-            </a:schemeClr>
-          </a:gs>
-        </a:gsLst>
-        <a:lin ang="10800000" scaled="1"/>
-        <a:tileRect/>
-      </a:gradFill>
-    </cs:spPr>
-  </cs:dataPoint3D>
-  <cs:dataPointLine>
-    <cs:lnRef idx="0">
-      <cs:styleClr val="auto"/>
-    </cs:lnRef>
-    <cs:fillRef idx="0"/>
-    <cs:effectRef idx="0"/>
-    <cs:fontRef idx="minor">
-      <a:schemeClr val="dk1"/>
-    </cs:fontRef>
-    <cs:spPr>
-      <a:ln w="28575" cap="rnd">
-        <a:solidFill>
-          <a:schemeClr val="phClr"/>
-        </a:solidFill>
-        <a:round/>
-      </a:ln>
-    </cs:spPr>
-  </cs:dataPointLine>
-  <cs:dataPointMarker>
-    <cs:lnRef idx="0">
-      <cs:styleClr val="auto"/>
-    </cs:lnRef>
-    <cs:fillRef idx="0">
-      <cs:styleClr val="auto"/>
-    </cs:fillRef>
-    <cs:effectRef idx="0"/>
-    <cs:fontRef idx="minor">
-      <a:schemeClr val="dk1"/>
-    </cs:fontRef>
-    <cs:spPr>
-      <a:gradFill>
-        <a:gsLst>
-          <a:gs pos="0">
-            <a:schemeClr val="phClr"/>
-          </a:gs>
-          <a:gs pos="46000">
-            <a:schemeClr val="phClr"/>
-          </a:gs>
-          <a:gs pos="100000">
-            <a:schemeClr val="phClr">
-              <a:lumMod val="20000"/>
-              <a:lumOff val="80000"/>
-              <a:alpha val="0"/>
-            </a:schemeClr>
-          </a:gs>
-        </a:gsLst>
-        <a:path path="circle">
-          <a:fillToRect l="50000" t="-80000" r="50000" b="180000"/>
-        </a:path>
-      </a:gradFill>
-      <a:ln w="9525" cap="flat" cmpd="sng" algn="ctr">
-        <a:solidFill>
-          <a:schemeClr val="phClr">
-            <a:shade val="95000"/>
-          </a:schemeClr>
-        </a:solidFill>
-        <a:round/>
-      </a:ln>
-    </cs:spPr>
-  </cs:dataPointMarker>
-  <cs:dataPointMarkerLayout symbol="circle" size="6"/>
-  <cs:dataPointWireframe>
-    <cs:lnRef idx="0">
-      <cs:styleClr val="auto"/>
-    </cs:lnRef>
-    <cs:fillRef idx="0"/>
-    <cs:effectRef idx="0"/>
-    <cs:fontRef idx="minor">
-      <a:schemeClr val="dk1"/>
-    </cs:fontRef>
-    <cs:spPr>
-      <a:ln w="9525" cap="rnd">
-        <a:solidFill>
-          <a:schemeClr val="phClr"/>
-        </a:solidFill>
-        <a:round/>
-      </a:ln>
-    </cs:spPr>
-  </cs:dataPointWireframe>
-  <cs:dataTable>
-    <cs:lnRef idx="0"/>
-    <cs:fillRef idx="0"/>
-    <cs:effectRef idx="0"/>
-    <cs:fontRef idx="minor">
-      <a:schemeClr val="tx1">
-        <a:lumMod val="65000"/>
-        <a:lumOff val="35000"/>
-      </a:schemeClr>
-    </cs:fontRef>
-    <cs:spPr>
-      <a:ln w="9525">
-        <a:solidFill>
-          <a:schemeClr val="tx1">
-            <a:lumMod val="15000"/>
-            <a:lumOff val="85000"/>
-          </a:schemeClr>
-        </a:solidFill>
-      </a:ln>
-    </cs:spPr>
-    <cs:defRPr sz="1197" kern="1200"/>
-  </cs:dataTable>
-  <cs:downBar>
-    <cs:lnRef idx="0"/>
-    <cs:fillRef idx="0"/>
-    <cs:effectRef idx="0"/>
-    <cs:fontRef idx="minor">
-      <a:schemeClr val="dk1"/>
-    </cs:fontRef>
-    <cs:spPr>
-      <a:solidFill>
-        <a:schemeClr val="dk1">
-          <a:lumMod val="75000"/>
-          <a:lumOff val="25000"/>
-        </a:schemeClr>
-      </a:solidFill>
-      <a:ln w="9525">
-        <a:solidFill>
-          <a:schemeClr val="tx1">
-            <a:lumMod val="65000"/>
-            <a:lumOff val="35000"/>
-          </a:schemeClr>
-        </a:solidFill>
-      </a:ln>
-    </cs:spPr>
-  </cs:downBar>
-  <cs:dropLine>
-    <cs:lnRef idx="0"/>
-    <cs:fillRef idx="0"/>
-    <cs:effectRef idx="0"/>
-    <cs:fontRef idx="minor">
-      <a:schemeClr val="dk1"/>
-    </cs:fontRef>
-    <cs:spPr>
-      <a:ln w="9525">
-        <a:solidFill>
-          <a:schemeClr val="tx1">
-            <a:lumMod val="35000"/>
-            <a:lumOff val="65000"/>
-          </a:schemeClr>
-        </a:solidFill>
-      </a:ln>
-    </cs:spPr>
-  </cs:dropLine>
-  <cs:errorBar>
-    <cs:lnRef idx="0"/>
-    <cs:fillRef idx="0"/>
-    <cs:effectRef idx="0"/>
-    <cs:fontRef idx="minor">
-      <a:schemeClr val="dk1"/>
-    </cs:fontRef>
-    <cs:spPr>
-      <a:ln w="9525" cap="flat" cmpd="sng" algn="ctr">
-        <a:solidFill>
-          <a:schemeClr val="tx1">
-            <a:lumMod val="65000"/>
-            <a:lumOff val="35000"/>
-          </a:schemeClr>
-        </a:solidFill>
-        <a:round/>
-      </a:ln>
-    </cs:spPr>
-  </cs:errorBar>
-  <cs:floor>
-    <cs:lnRef idx="0"/>
-    <cs:fillRef idx="0"/>
-    <cs:effectRef idx="0"/>
-    <cs:fontRef idx="minor">
-      <a:schemeClr val="dk1"/>
-    </cs:fontRef>
-  </cs:floor>
-  <cs:gridlineMajor>
-    <cs:lnRef idx="0"/>
-    <cs:fillRef idx="0"/>
-    <cs:effectRef idx="0"/>
-    <cs:fontRef idx="minor">
-      <a:schemeClr val="dk1"/>
-    </cs:fontRef>
-    <cs:spPr>
-      <a:ln w="9525" cap="flat" cmpd="sng" algn="ctr">
-        <a:gradFill>
-          <a:gsLst>
-            <a:gs pos="99000">
-              <a:schemeClr val="tx1">
-                <a:lumMod val="25000"/>
-                <a:lumOff val="75000"/>
-              </a:schemeClr>
-            </a:gs>
-            <a:gs pos="0">
-              <a:schemeClr val="tx1">
-                <a:lumMod val="15000"/>
-                <a:lumOff val="85000"/>
-              </a:schemeClr>
-            </a:gs>
-          </a:gsLst>
-          <a:lin ang="5400000" scaled="0"/>
-        </a:gradFill>
-        <a:round/>
-      </a:ln>
-    </cs:spPr>
-  </cs:gridlineMajor>
-  <cs:gridlineMinor>
-    <cs:lnRef idx="0"/>
-    <cs:fillRef idx="0"/>
-    <cs:effectRef idx="0"/>
-    <cs:fontRef idx="minor">
-      <a:schemeClr val="dk1"/>
-    </cs:fontRef>
-    <cs:spPr>
-      <a:ln w="9525" cap="flat" cmpd="sng" algn="ctr">
-        <a:gradFill>
-          <a:gsLst>
-            <a:gs pos="100000">
-              <a:schemeClr val="tx1">
-                <a:lumMod val="15000"/>
-                <a:lumOff val="85000"/>
-              </a:schemeClr>
-            </a:gs>
-            <a:gs pos="0">
-              <a:schemeClr val="tx1">
-                <a:lumMod val="5000"/>
-                <a:lumOff val="95000"/>
-              </a:schemeClr>
-            </a:gs>
-          </a:gsLst>
-          <a:lin ang="5400000" scaled="0"/>
-        </a:gradFill>
-        <a:round/>
-      </a:ln>
-    </cs:spPr>
-  </cs:gridlineMinor>
-  <cs:hiLoLine>
-    <cs:lnRef idx="0"/>
-    <cs:fillRef idx="0"/>
-    <cs:effectRef idx="0"/>
-    <cs:fontRef idx="minor">
-      <a:schemeClr val="dk1"/>
-    </cs:fontRef>
-    <cs:spPr>
-      <a:ln w="9525">
-        <a:solidFill>
-          <a:schemeClr val="tx1">
-            <a:lumMod val="50000"/>
-            <a:lumOff val="50000"/>
-          </a:schemeClr>
-        </a:solidFill>
-      </a:ln>
-    </cs:spPr>
-  </cs:hiLoLine>
-  <cs:leaderLine>
-    <cs:lnRef idx="0"/>
-    <cs:fillRef idx="0"/>
-    <cs:effectRef idx="0"/>
-    <cs:fontRef idx="minor">
-      <a:schemeClr val="dk1"/>
-    </cs:fontRef>
-    <cs:spPr>
-      <a:ln w="9525">
-        <a:solidFill>
-          <a:schemeClr val="tx1">
-            <a:lumMod val="35000"/>
-            <a:lumOff val="65000"/>
-          </a:schemeClr>
-        </a:solidFill>
-      </a:ln>
-    </cs:spPr>
-  </cs:leaderLine>
-  <cs:legend>
-    <cs:lnRef idx="0"/>
-    <cs:fillRef idx="0"/>
-    <cs:effectRef idx="0"/>
-    <cs:fontRef idx="minor">
-      <a:schemeClr val="tx1">
-        <a:lumMod val="65000"/>
-        <a:lumOff val="35000"/>
-      </a:schemeClr>
-    </cs:fontRef>
-    <cs:defRPr sz="1197" kern="1200"/>
-  </cs:legend>
-  <cs:plotArea mods="allowNoFillOverride allowNoLineOverride">
-    <cs:lnRef idx="0"/>
-    <cs:fillRef idx="0"/>
-    <cs:effectRef idx="0"/>
-    <cs:fontRef idx="minor">
-      <a:schemeClr val="dk1"/>
-    </cs:fontRef>
-  </cs:plotArea>
-  <cs:plotArea3D mods="allowNoFillOverride allowNoLineOverride">
-    <cs:lnRef idx="0"/>
-    <cs:fillRef idx="0"/>
-    <cs:effectRef idx="0"/>
-    <cs:fontRef idx="minor">
-      <a:schemeClr val="dk1"/>
-    </cs:fontRef>
-  </cs:plotArea3D>
-  <cs:seriesAxis>
-    <cs:lnRef idx="0"/>
-    <cs:fillRef idx="0"/>
-    <cs:effectRef idx="0"/>
-    <cs:fontRef idx="minor">
-      <a:schemeClr val="tx1">
-        <a:lumMod val="65000"/>
-        <a:lumOff val="35000"/>
-      </a:schemeClr>
-    </cs:fontRef>
-    <cs:spPr>
-      <a:ln w="9525" cap="flat" cmpd="sng" algn="ctr">
-        <a:solidFill>
-          <a:schemeClr val="tx1">
-            <a:lumMod val="15000"/>
-            <a:lumOff val="85000"/>
-          </a:schemeClr>
-        </a:solidFill>
-        <a:round/>
-        <a:headEnd type="none" w="sm" len="sm"/>
-        <a:tailEnd type="none" w="sm" len="sm"/>
-      </a:ln>
-    </cs:spPr>
-    <cs:defRPr sz="1197" kern="1200"/>
-  </cs:seriesAxis>
-  <cs:seriesLine>
-    <cs:lnRef idx="0"/>
-    <cs:fillRef idx="0"/>
-    <cs:effectRef idx="0"/>
-    <cs:fontRef idx="minor">
-      <a:schemeClr val="dk1"/>
-    </cs:fontRef>
-    <cs:spPr>
-      <a:ln w="9525">
-        <a:solidFill>
-          <a:schemeClr val="tx1">
-            <a:lumMod val="35000"/>
-            <a:lumOff val="65000"/>
-          </a:schemeClr>
-        </a:solidFill>
-        <a:round/>
-      </a:ln>
-    </cs:spPr>
-  </cs:seriesLine>
-  <cs:title>
-    <cs:lnRef idx="0"/>
-    <cs:fillRef idx="0"/>
-    <cs:effectRef idx="0"/>
-    <cs:fontRef idx="minor">
-      <a:schemeClr val="tx1">
-        <a:lumMod val="65000"/>
-        <a:lumOff val="35000"/>
-      </a:schemeClr>
-    </cs:fontRef>
-    <cs:defRPr sz="2200" b="1" kern="1200" cap="all" spc="50" baseline="0"/>
-  </cs:title>
-  <cs:trendline>
-    <cs:lnRef idx="0">
-      <cs:styleClr val="auto"/>
-    </cs:lnRef>
-    <cs:fillRef idx="0"/>
-    <cs:effectRef idx="0"/>
-    <cs:fontRef idx="minor">
-      <a:schemeClr val="dk1"/>
-    </cs:fontRef>
-    <cs:spPr>
-      <a:ln w="9525" cap="rnd">
-        <a:solidFill>
-          <a:schemeClr val="phClr"/>
-        </a:solidFill>
-      </a:ln>
-    </cs:spPr>
-  </cs:trendline>
-  <cs:trendlineLabel>
-    <cs:lnRef idx="0"/>
-    <cs:fillRef idx="0"/>
-    <cs:effectRef idx="0"/>
-    <cs:fontRef idx="minor">
-      <a:schemeClr val="tx1">
-        <a:lumMod val="65000"/>
-        <a:lumOff val="35000"/>
-      </a:schemeClr>
-    </cs:fontRef>
-    <cs:defRPr sz="1197" kern="1200"/>
-  </cs:trendlineLabel>
-  <cs:upBar>
-    <cs:lnRef idx="0"/>
-    <cs:fillRef idx="0"/>
-    <cs:effectRef idx="0"/>
-    <cs:fontRef idx="minor">
-      <a:schemeClr val="dk1"/>
-    </cs:fontRef>
-    <cs:spPr>
-      <a:solidFill>
-        <a:schemeClr val="lt1"/>
-      </a:solidFill>
-      <a:ln w="9525">
-        <a:solidFill>
-          <a:schemeClr val="tx1">
-            <a:lumMod val="65000"/>
-            <a:lumOff val="35000"/>
-          </a:schemeClr>
-        </a:solidFill>
-      </a:ln>
-    </cs:spPr>
-  </cs:upBar>
-  <cs:valueAxis>
-    <cs:lnRef idx="0"/>
-    <cs:fillRef idx="0"/>
-    <cs:effectRef idx="0"/>
-    <cs:fontRef idx="minor">
-      <a:schemeClr val="tx1">
-        <a:lumMod val="65000"/>
-        <a:lumOff val="35000"/>
-      </a:schemeClr>
-    </cs:fontRef>
-    <cs:defRPr sz="1197" kern="1200"/>
-  </cs:valueAxis>
-  <cs:wall>
-    <cs:lnRef idx="0"/>
-    <cs:fillRef idx="0"/>
-    <cs:effectRef idx="0"/>
-    <cs:fontRef idx="minor">
-      <a:schemeClr val="dk1"/>
-    </cs:fontRef>
-  </cs:wall>
-</cs:chartStyle>
 </file>
 
 <file path=ppt/handoutMasters/handoutMaster1.xml><?xml version="1.0" encoding="utf-8"?>
@@ -18783,2286 +17550,6 @@
           <p:cNvPr id="2" name="Title 1">
             <a:extLst>
               <a:ext uri="{FF2B5EF4-FFF2-40B4-BE49-F238E27FC236}">
-                <a16:creationId xmlns:a16="http://schemas.microsoft.com/office/drawing/2014/main" id="{EE30DEE9-2DBD-C997-C208-027230B5A3EA}"/>
-              </a:ext>
-            </a:extLst>
-          </p:cNvPr>
-          <p:cNvSpPr>
-            <a:spLocks noGrp="1"/>
-          </p:cNvSpPr>
-          <p:nvPr>
-            <p:ph type="title"/>
-          </p:nvPr>
-        </p:nvSpPr>
-        <p:spPr>
-          <a:xfrm>
-            <a:off x="1098804" y="832104"/>
-            <a:ext cx="9994392" cy="1069848"/>
-          </a:xfrm>
-        </p:spPr>
-        <p:txBody>
-          <a:bodyPr/>
-          <a:lstStyle/>
-          <a:p>
-            <a:r>
-              <a:rPr lang="en-US" sz="4000" b="1" spc="600" dirty="0">
-                <a:ln w="28575">
-                  <a:noFill/>
-                  <a:prstDash val="solid"/>
-                </a:ln>
-                <a:solidFill>
-                  <a:schemeClr val="bg1"/>
-                </a:solidFill>
-                <a:latin typeface="Tw Cen MT" panose="020B0602020104020603" pitchFamily="34" charset="77"/>
-              </a:rPr>
-              <a:t>GLOBAL CURRENCY MARKETS</a:t>
-            </a:r>
-          </a:p>
-        </p:txBody>
-      </p:sp>
-      <p:sp>
-        <p:nvSpPr>
-          <p:cNvPr id="5" name="Slide Number Placeholder 4">
-            <a:extLst>
-              <a:ext uri="{FF2B5EF4-FFF2-40B4-BE49-F238E27FC236}">
-                <a16:creationId xmlns:a16="http://schemas.microsoft.com/office/drawing/2014/main" id="{F79CF1F9-4847-1440-0352-6D1284A48D05}"/>
-              </a:ext>
-            </a:extLst>
-          </p:cNvPr>
-          <p:cNvSpPr>
-            <a:spLocks noGrp="1"/>
-          </p:cNvSpPr>
-          <p:nvPr>
-            <p:ph type="sldNum" sz="quarter" idx="11"/>
-          </p:nvPr>
-        </p:nvSpPr>
-        <p:spPr/>
-        <p:txBody>
-          <a:bodyPr/>
-          <a:lstStyle/>
-          <a:p>
-            <a:fld id="{294A09A9-5501-47C1-A89A-A340965A2BE2}" type="slidenum">
-              <a:rPr lang="en-US" smtClean="0"/>
-              <a:pPr/>
-              <a:t>10</a:t>
-            </a:fld>
-            <a:endParaRPr lang="en-US" dirty="0"/>
-          </a:p>
-        </p:txBody>
-      </p:sp>
-      <p:graphicFrame>
-        <p:nvGraphicFramePr>
-          <p:cNvPr id="4" name="Table 4">
-            <a:extLst>
-              <a:ext uri="{FF2B5EF4-FFF2-40B4-BE49-F238E27FC236}">
-                <a16:creationId xmlns:a16="http://schemas.microsoft.com/office/drawing/2014/main" id="{49C20947-A133-32C2-D0F4-654D337A74ED}"/>
-              </a:ext>
-            </a:extLst>
-          </p:cNvPr>
-          <p:cNvGraphicFramePr>
-            <a:graphicFrameLocks noGrp="1"/>
-          </p:cNvGraphicFramePr>
-          <p:nvPr>
-            <p:ph idx="1"/>
-            <p:extLst>
-              <p:ext uri="{D42A27DB-BD31-4B8C-83A1-F6EECF244321}">
-                <p14:modId xmlns:p14="http://schemas.microsoft.com/office/powerpoint/2010/main" val="3951968750"/>
-              </p:ext>
-            </p:extLst>
-          </p:nvPr>
-        </p:nvGraphicFramePr>
-        <p:xfrm>
-          <a:off x="1324266" y="2212975"/>
-          <a:ext cx="9543469" cy="2963361"/>
-        </p:xfrm>
-        <a:graphic>
-          <a:graphicData uri="http://schemas.openxmlformats.org/drawingml/2006/table">
-            <a:tbl>
-              <a:tblPr firstRow="1" lastCol="1" bandRow="1">
-                <a:tableStyleId>{5C22544A-7EE6-4342-B048-85BDC9FD1C3A}</a:tableStyleId>
-              </a:tblPr>
-              <a:tblGrid>
-                <a:gridCol w="925972">
-                  <a:extLst>
-                    <a:ext uri="{9D8B030D-6E8A-4147-A177-3AD203B41FA5}">
-                      <a16:colId xmlns:a16="http://schemas.microsoft.com/office/drawing/2014/main" val="1689330750"/>
-                    </a:ext>
-                  </a:extLst>
-                </a:gridCol>
-                <a:gridCol w="2152890">
-                  <a:extLst>
-                    <a:ext uri="{9D8B030D-6E8A-4147-A177-3AD203B41FA5}">
-                      <a16:colId xmlns:a16="http://schemas.microsoft.com/office/drawing/2014/main" val="2660631934"/>
-                    </a:ext>
-                  </a:extLst>
-                </a:gridCol>
-                <a:gridCol w="2164466">
-                  <a:extLst>
-                    <a:ext uri="{9D8B030D-6E8A-4147-A177-3AD203B41FA5}">
-                      <a16:colId xmlns:a16="http://schemas.microsoft.com/office/drawing/2014/main" val="3909717689"/>
-                    </a:ext>
-                  </a:extLst>
-                </a:gridCol>
-                <a:gridCol w="2141317">
-                  <a:extLst>
-                    <a:ext uri="{9D8B030D-6E8A-4147-A177-3AD203B41FA5}">
-                      <a16:colId xmlns:a16="http://schemas.microsoft.com/office/drawing/2014/main" val="1603189107"/>
-                    </a:ext>
-                  </a:extLst>
-                </a:gridCol>
-                <a:gridCol w="2158824">
-                  <a:extLst>
-                    <a:ext uri="{9D8B030D-6E8A-4147-A177-3AD203B41FA5}">
-                      <a16:colId xmlns:a16="http://schemas.microsoft.com/office/drawing/2014/main" val="2755691855"/>
-                    </a:ext>
-                  </a:extLst>
-                </a:gridCol>
-              </a:tblGrid>
-              <a:tr h="426377">
-                <a:tc>
-                  <a:txBody>
-                    <a:bodyPr/>
-                    <a:lstStyle/>
-                    <a:p>
-                      <a:pPr algn="ctr"/>
-                      <a:endParaRPr lang="en-US" sz="2000" dirty="0">
-                        <a:solidFill>
-                          <a:schemeClr val="bg1"/>
-                        </a:solidFill>
-                        <a:latin typeface="Segoe UI" panose="020B0502040204020203" pitchFamily="34" charset="0"/>
-                        <a:cs typeface="Segoe UI" panose="020B0502040204020203" pitchFamily="34" charset="0"/>
-                      </a:endParaRPr>
-                    </a:p>
-                  </a:txBody>
-                  <a:tcPr anchor="ctr">
-                    <a:lnL w="12700" cap="flat" cmpd="sng" algn="ctr">
-                      <a:solidFill>
-                        <a:schemeClr val="accent3">
-                          <a:lumMod val="25000"/>
-                        </a:schemeClr>
-                      </a:solidFill>
-                      <a:prstDash val="solid"/>
-                      <a:round/>
-                      <a:headEnd type="none" w="med" len="med"/>
-                      <a:tailEnd type="none" w="med" len="med"/>
-                    </a:lnL>
-                    <a:lnR w="12700" cap="flat" cmpd="sng" algn="ctr">
-                      <a:solidFill>
-                        <a:schemeClr val="accent3">
-                          <a:lumMod val="25000"/>
-                        </a:schemeClr>
-                      </a:solidFill>
-                      <a:prstDash val="solid"/>
-                      <a:round/>
-                      <a:headEnd type="none" w="med" len="med"/>
-                      <a:tailEnd type="none" w="med" len="med"/>
-                    </a:lnR>
-                    <a:lnT w="12700" cap="flat" cmpd="sng" algn="ctr">
-                      <a:solidFill>
-                        <a:schemeClr val="accent3">
-                          <a:lumMod val="25000"/>
-                        </a:schemeClr>
-                      </a:solidFill>
-                      <a:prstDash val="solid"/>
-                      <a:round/>
-                      <a:headEnd type="none" w="med" len="med"/>
-                      <a:tailEnd type="none" w="med" len="med"/>
-                    </a:lnT>
-                    <a:lnB w="12700" cap="flat" cmpd="sng" algn="ctr">
-                      <a:solidFill>
-                        <a:schemeClr val="accent3">
-                          <a:lumMod val="25000"/>
-                        </a:schemeClr>
-                      </a:solidFill>
-                      <a:prstDash val="solid"/>
-                      <a:round/>
-                      <a:headEnd type="none" w="med" len="med"/>
-                      <a:tailEnd type="none" w="med" len="med"/>
-                    </a:lnB>
-                    <a:lnTlToBr w="12700" cmpd="sng">
-                      <a:noFill/>
-                      <a:prstDash val="solid"/>
-                    </a:lnTlToBr>
-                    <a:lnBlToTr w="12700" cmpd="sng">
-                      <a:noFill/>
-                      <a:prstDash val="solid"/>
-                    </a:lnBlToTr>
-                    <a:solidFill>
-                      <a:schemeClr val="bg1">
-                        <a:alpha val="40000"/>
-                      </a:schemeClr>
-                    </a:solidFill>
-                  </a:tcPr>
-                </a:tc>
-                <a:tc>
-                  <a:txBody>
-                    <a:bodyPr/>
-                    <a:lstStyle/>
-                    <a:p>
-                      <a:pPr algn="ctr"/>
-                      <a:r>
-                        <a:rPr lang="en-US" sz="2400" b="1" i="0" dirty="0">
-                          <a:solidFill>
-                            <a:schemeClr val="accent3">
-                              <a:lumMod val="25000"/>
-                            </a:schemeClr>
-                          </a:solidFill>
-                          <a:latin typeface="Tw Cen MT" panose="020B0602020104020603" pitchFamily="34" charset="77"/>
-                          <a:cs typeface="Segoe UI Light" panose="020B0502040204020203" pitchFamily="34" charset="0"/>
-                        </a:rPr>
-                        <a:t>$USD</a:t>
-                      </a:r>
-                    </a:p>
-                  </a:txBody>
-                  <a:tcPr anchor="ctr">
-                    <a:lnL w="12700" cap="flat" cmpd="sng" algn="ctr">
-                      <a:solidFill>
-                        <a:schemeClr val="accent3">
-                          <a:lumMod val="25000"/>
-                        </a:schemeClr>
-                      </a:solidFill>
-                      <a:prstDash val="solid"/>
-                      <a:round/>
-                      <a:headEnd type="none" w="med" len="med"/>
-                      <a:tailEnd type="none" w="med" len="med"/>
-                    </a:lnL>
-                    <a:lnR w="12700" cap="flat" cmpd="sng" algn="ctr">
-                      <a:solidFill>
-                        <a:schemeClr val="accent3">
-                          <a:lumMod val="25000"/>
-                        </a:schemeClr>
-                      </a:solidFill>
-                      <a:prstDash val="solid"/>
-                      <a:round/>
-                      <a:headEnd type="none" w="med" len="med"/>
-                      <a:tailEnd type="none" w="med" len="med"/>
-                    </a:lnR>
-                    <a:lnT w="12700" cap="flat" cmpd="sng" algn="ctr">
-                      <a:solidFill>
-                        <a:schemeClr val="accent3">
-                          <a:lumMod val="25000"/>
-                        </a:schemeClr>
-                      </a:solidFill>
-                      <a:prstDash val="solid"/>
-                      <a:round/>
-                      <a:headEnd type="none" w="med" len="med"/>
-                      <a:tailEnd type="none" w="med" len="med"/>
-                    </a:lnT>
-                    <a:lnB w="12700" cap="flat" cmpd="sng" algn="ctr">
-                      <a:solidFill>
-                        <a:schemeClr val="accent3">
-                          <a:lumMod val="25000"/>
-                        </a:schemeClr>
-                      </a:solidFill>
-                      <a:prstDash val="solid"/>
-                      <a:round/>
-                      <a:headEnd type="none" w="med" len="med"/>
-                      <a:tailEnd type="none" w="med" len="med"/>
-                    </a:lnB>
-                    <a:lnTlToBr w="12700" cmpd="sng">
-                      <a:noFill/>
-                      <a:prstDash val="solid"/>
-                    </a:lnTlToBr>
-                    <a:lnBlToTr w="12700" cmpd="sng">
-                      <a:noFill/>
-                      <a:prstDash val="solid"/>
-                    </a:lnBlToTr>
-                    <a:solidFill>
-                      <a:schemeClr val="accent6"/>
-                    </a:solidFill>
-                  </a:tcPr>
-                </a:tc>
-                <a:tc>
-                  <a:txBody>
-                    <a:bodyPr/>
-                    <a:lstStyle/>
-                    <a:p>
-                      <a:pPr algn="ctr"/>
-                      <a:r>
-                        <a:rPr lang="en-US" sz="2400" b="1" i="0" dirty="0">
-                          <a:solidFill>
-                            <a:schemeClr val="accent3">
-                              <a:lumMod val="25000"/>
-                            </a:schemeClr>
-                          </a:solidFill>
-                          <a:latin typeface="Tw Cen MT" panose="020B0602020104020603" pitchFamily="34" charset="77"/>
-                          <a:cs typeface="Segoe UI Light" panose="020B0502040204020203" pitchFamily="34" charset="0"/>
-                        </a:rPr>
-                        <a:t>£EUR</a:t>
-                      </a:r>
-                    </a:p>
-                  </a:txBody>
-                  <a:tcPr anchor="ctr">
-                    <a:lnL w="12700" cap="flat" cmpd="sng" algn="ctr">
-                      <a:solidFill>
-                        <a:schemeClr val="accent3">
-                          <a:lumMod val="25000"/>
-                        </a:schemeClr>
-                      </a:solidFill>
-                      <a:prstDash val="solid"/>
-                      <a:round/>
-                      <a:headEnd type="none" w="med" len="med"/>
-                      <a:tailEnd type="none" w="med" len="med"/>
-                    </a:lnL>
-                    <a:lnR w="12700" cap="flat" cmpd="sng" algn="ctr">
-                      <a:solidFill>
-                        <a:schemeClr val="accent3">
-                          <a:lumMod val="25000"/>
-                        </a:schemeClr>
-                      </a:solidFill>
-                      <a:prstDash val="solid"/>
-                      <a:round/>
-                      <a:headEnd type="none" w="med" len="med"/>
-                      <a:tailEnd type="none" w="med" len="med"/>
-                    </a:lnR>
-                    <a:lnT w="12700" cap="flat" cmpd="sng" algn="ctr">
-                      <a:solidFill>
-                        <a:schemeClr val="accent3">
-                          <a:lumMod val="25000"/>
-                        </a:schemeClr>
-                      </a:solidFill>
-                      <a:prstDash val="solid"/>
-                      <a:round/>
-                      <a:headEnd type="none" w="med" len="med"/>
-                      <a:tailEnd type="none" w="med" len="med"/>
-                    </a:lnT>
-                    <a:lnB w="12700" cap="flat" cmpd="sng" algn="ctr">
-                      <a:solidFill>
-                        <a:schemeClr val="accent3">
-                          <a:lumMod val="25000"/>
-                        </a:schemeClr>
-                      </a:solidFill>
-                      <a:prstDash val="solid"/>
-                      <a:round/>
-                      <a:headEnd type="none" w="med" len="med"/>
-                      <a:tailEnd type="none" w="med" len="med"/>
-                    </a:lnB>
-                    <a:lnTlToBr w="12700" cmpd="sng">
-                      <a:noFill/>
-                      <a:prstDash val="solid"/>
-                    </a:lnTlToBr>
-                    <a:lnBlToTr w="12700" cmpd="sng">
-                      <a:noFill/>
-                      <a:prstDash val="solid"/>
-                    </a:lnBlToTr>
-                    <a:solidFill>
-                      <a:schemeClr val="accent5"/>
-                    </a:solidFill>
-                  </a:tcPr>
-                </a:tc>
-                <a:tc>
-                  <a:txBody>
-                    <a:bodyPr/>
-                    <a:lstStyle/>
-                    <a:p>
-                      <a:pPr lvl="0" algn="ctr">
-                        <a:buNone/>
-                      </a:pPr>
-                      <a:r>
-                        <a:rPr lang="en-US" sz="2400" b="1" i="0" dirty="0">
-                          <a:solidFill>
-                            <a:schemeClr val="accent3">
-                              <a:lumMod val="25000"/>
-                            </a:schemeClr>
-                          </a:solidFill>
-                          <a:latin typeface="Tw Cen MT" panose="020B0602020104020603" pitchFamily="34" charset="77"/>
-                          <a:cs typeface="Segoe UI Light" panose="020B0502040204020203" pitchFamily="34" charset="0"/>
-                        </a:rPr>
-                        <a:t>¥JPY</a:t>
-                      </a:r>
-                    </a:p>
-                  </a:txBody>
-                  <a:tcPr anchor="ctr">
-                    <a:lnL w="12700" cap="flat" cmpd="sng" algn="ctr">
-                      <a:solidFill>
-                        <a:schemeClr val="accent3">
-                          <a:lumMod val="25000"/>
-                        </a:schemeClr>
-                      </a:solidFill>
-                      <a:prstDash val="solid"/>
-                      <a:round/>
-                      <a:headEnd type="none" w="med" len="med"/>
-                      <a:tailEnd type="none" w="med" len="med"/>
-                    </a:lnL>
-                    <a:lnR w="12700" cap="flat" cmpd="sng" algn="ctr">
-                      <a:solidFill>
-                        <a:schemeClr val="accent3">
-                          <a:lumMod val="25000"/>
-                        </a:schemeClr>
-                      </a:solidFill>
-                      <a:prstDash val="solid"/>
-                      <a:round/>
-                      <a:headEnd type="none" w="med" len="med"/>
-                      <a:tailEnd type="none" w="med" len="med"/>
-                    </a:lnR>
-                    <a:lnT w="12700" cap="flat" cmpd="sng" algn="ctr">
-                      <a:solidFill>
-                        <a:schemeClr val="accent3">
-                          <a:lumMod val="25000"/>
-                        </a:schemeClr>
-                      </a:solidFill>
-                      <a:prstDash val="solid"/>
-                      <a:round/>
-                      <a:headEnd type="none" w="med" len="med"/>
-                      <a:tailEnd type="none" w="med" len="med"/>
-                    </a:lnT>
-                    <a:lnB w="12700" cap="flat" cmpd="sng" algn="ctr">
-                      <a:solidFill>
-                        <a:schemeClr val="accent3">
-                          <a:lumMod val="25000"/>
-                        </a:schemeClr>
-                      </a:solidFill>
-                      <a:prstDash val="solid"/>
-                      <a:round/>
-                      <a:headEnd type="none" w="med" len="med"/>
-                      <a:tailEnd type="none" w="med" len="med"/>
-                    </a:lnB>
-                    <a:lnTlToBr w="12700" cmpd="sng">
-                      <a:noFill/>
-                      <a:prstDash val="solid"/>
-                    </a:lnTlToBr>
-                    <a:lnBlToTr w="12700" cmpd="sng">
-                      <a:noFill/>
-                      <a:prstDash val="solid"/>
-                    </a:lnBlToTr>
-                    <a:solidFill>
-                      <a:schemeClr val="accent4"/>
-                    </a:solidFill>
-                  </a:tcPr>
-                </a:tc>
-                <a:tc>
-                  <a:txBody>
-                    <a:bodyPr/>
-                    <a:lstStyle/>
-                    <a:p>
-                      <a:pPr lvl="0" algn="ctr">
-                        <a:buNone/>
-                      </a:pPr>
-                      <a:r>
-                        <a:rPr lang="en-US" sz="2400" b="1" i="0" u="none" strike="noStrike" noProof="0" dirty="0">
-                          <a:solidFill>
-                            <a:schemeClr val="accent3">
-                              <a:lumMod val="25000"/>
-                            </a:schemeClr>
-                          </a:solidFill>
-                          <a:latin typeface="Tw Cen MT" panose="020B0602020104020603" pitchFamily="34" charset="77"/>
-                          <a:cs typeface="Segoe UI Light" panose="020B0502040204020203" pitchFamily="34" charset="0"/>
-                        </a:rPr>
-                        <a:t>₿</a:t>
-                      </a:r>
-                      <a:r>
-                        <a:rPr lang="en-US" sz="2400" b="1" i="0" dirty="0">
-                          <a:solidFill>
-                            <a:schemeClr val="accent3">
-                              <a:lumMod val="25000"/>
-                            </a:schemeClr>
-                          </a:solidFill>
-                          <a:latin typeface="Tw Cen MT" panose="020B0602020104020603" pitchFamily="34" charset="77"/>
-                          <a:cs typeface="Segoe UI Light" panose="020B0502040204020203" pitchFamily="34" charset="0"/>
-                        </a:rPr>
-                        <a:t>BTC</a:t>
-                      </a:r>
-                    </a:p>
-                  </a:txBody>
-                  <a:tcPr anchor="ctr">
-                    <a:lnL w="12700" cap="flat" cmpd="sng" algn="ctr">
-                      <a:solidFill>
-                        <a:schemeClr val="accent3">
-                          <a:lumMod val="25000"/>
-                        </a:schemeClr>
-                      </a:solidFill>
-                      <a:prstDash val="solid"/>
-                      <a:round/>
-                      <a:headEnd type="none" w="med" len="med"/>
-                      <a:tailEnd type="none" w="med" len="med"/>
-                    </a:lnL>
-                    <a:lnR w="12700" cap="flat" cmpd="sng" algn="ctr">
-                      <a:solidFill>
-                        <a:schemeClr val="accent3">
-                          <a:lumMod val="25000"/>
-                        </a:schemeClr>
-                      </a:solidFill>
-                      <a:prstDash val="solid"/>
-                      <a:round/>
-                      <a:headEnd type="none" w="med" len="med"/>
-                      <a:tailEnd type="none" w="med" len="med"/>
-                    </a:lnR>
-                    <a:lnT w="12700" cap="flat" cmpd="sng" algn="ctr">
-                      <a:solidFill>
-                        <a:schemeClr val="accent3">
-                          <a:lumMod val="25000"/>
-                        </a:schemeClr>
-                      </a:solidFill>
-                      <a:prstDash val="solid"/>
-                      <a:round/>
-                      <a:headEnd type="none" w="med" len="med"/>
-                      <a:tailEnd type="none" w="med" len="med"/>
-                    </a:lnT>
-                    <a:lnB w="12700" cap="flat" cmpd="sng" algn="ctr">
-                      <a:solidFill>
-                        <a:schemeClr val="accent3">
-                          <a:lumMod val="25000"/>
-                        </a:schemeClr>
-                      </a:solidFill>
-                      <a:prstDash val="solid"/>
-                      <a:round/>
-                      <a:headEnd type="none" w="med" len="med"/>
-                      <a:tailEnd type="none" w="med" len="med"/>
-                    </a:lnB>
-                    <a:lnTlToBr w="12700" cmpd="sng">
-                      <a:noFill/>
-                      <a:prstDash val="solid"/>
-                    </a:lnTlToBr>
-                    <a:lnBlToTr w="12700" cmpd="sng">
-                      <a:noFill/>
-                      <a:prstDash val="solid"/>
-                    </a:lnBlToTr>
-                    <a:solidFill>
-                      <a:schemeClr val="tx2"/>
-                    </a:solidFill>
-                  </a:tcPr>
-                </a:tc>
-                <a:extLst>
-                  <a:ext uri="{0D108BD9-81ED-4DB2-BD59-A6C34878D82A}">
-                    <a16:rowId xmlns:a16="http://schemas.microsoft.com/office/drawing/2014/main" val="479928716"/>
-                  </a:ext>
-                </a:extLst>
-              </a:tr>
-              <a:tr h="607863">
-                <a:tc>
-                  <a:txBody>
-                    <a:bodyPr/>
-                    <a:lstStyle/>
-                    <a:p>
-                      <a:pPr algn="ctr"/>
-                      <a:r>
-                        <a:rPr lang="en-US" sz="1600" b="0" i="0" dirty="0">
-                          <a:solidFill>
-                            <a:schemeClr val="bg1"/>
-                          </a:solidFill>
-                          <a:latin typeface="Segoe UI Light" panose="020B0502040204020203" pitchFamily="34" charset="0"/>
-                          <a:cs typeface="Segoe UI Light" panose="020B0502040204020203" pitchFamily="34" charset="0"/>
-                        </a:rPr>
-                        <a:t>Q1</a:t>
-                      </a:r>
-                    </a:p>
-                  </a:txBody>
-                  <a:tcPr anchor="ctr">
-                    <a:lnL w="12700" cap="flat" cmpd="sng" algn="ctr">
-                      <a:solidFill>
-                        <a:schemeClr val="accent3">
-                          <a:lumMod val="25000"/>
-                        </a:schemeClr>
-                      </a:solidFill>
-                      <a:prstDash val="solid"/>
-                      <a:round/>
-                      <a:headEnd type="none" w="med" len="med"/>
-                      <a:tailEnd type="none" w="med" len="med"/>
-                    </a:lnL>
-                    <a:lnR w="12700" cap="flat" cmpd="sng" algn="ctr">
-                      <a:solidFill>
-                        <a:schemeClr val="accent3">
-                          <a:lumMod val="25000"/>
-                        </a:schemeClr>
-                      </a:solidFill>
-                      <a:prstDash val="solid"/>
-                      <a:round/>
-                      <a:headEnd type="none" w="med" len="med"/>
-                      <a:tailEnd type="none" w="med" len="med"/>
-                    </a:lnR>
-                    <a:lnT w="12700" cap="flat" cmpd="sng" algn="ctr">
-                      <a:solidFill>
-                        <a:schemeClr val="accent3">
-                          <a:lumMod val="25000"/>
-                        </a:schemeClr>
-                      </a:solidFill>
-                      <a:prstDash val="solid"/>
-                      <a:round/>
-                      <a:headEnd type="none" w="med" len="med"/>
-                      <a:tailEnd type="none" w="med" len="med"/>
-                    </a:lnT>
-                    <a:lnB w="12700" cap="flat" cmpd="sng" algn="ctr">
-                      <a:solidFill>
-                        <a:schemeClr val="accent3">
-                          <a:lumMod val="25000"/>
-                        </a:schemeClr>
-                      </a:solidFill>
-                      <a:prstDash val="solid"/>
-                      <a:round/>
-                      <a:headEnd type="none" w="med" len="med"/>
-                      <a:tailEnd type="none" w="med" len="med"/>
-                    </a:lnB>
-                    <a:lnTlToBr w="12700" cmpd="sng">
-                      <a:noFill/>
-                      <a:prstDash val="solid"/>
-                    </a:lnTlToBr>
-                    <a:lnBlToTr w="12700" cmpd="sng">
-                      <a:noFill/>
-                      <a:prstDash val="solid"/>
-                    </a:lnBlToTr>
-                    <a:solidFill>
-                      <a:schemeClr val="bg1">
-                        <a:alpha val="30000"/>
-                      </a:schemeClr>
-                    </a:solidFill>
-                  </a:tcPr>
-                </a:tc>
-                <a:tc>
-                  <a:txBody>
-                    <a:bodyPr/>
-                    <a:lstStyle/>
-                    <a:p>
-                      <a:pPr algn="ctr"/>
-                      <a:r>
-                        <a:rPr lang="en-US" sz="1600" b="0" i="0" dirty="0">
-                          <a:solidFill>
-                            <a:schemeClr val="bg1"/>
-                          </a:solidFill>
-                          <a:latin typeface="Segoe UI Light" panose="020B0502040204020203" pitchFamily="34" charset="0"/>
-                          <a:cs typeface="Segoe UI Light" panose="020B0502040204020203" pitchFamily="34" charset="0"/>
-                        </a:rPr>
-                        <a:t>4.5</a:t>
-                      </a:r>
-                    </a:p>
-                  </a:txBody>
-                  <a:tcPr anchor="ctr">
-                    <a:lnL w="12700" cap="flat" cmpd="sng" algn="ctr">
-                      <a:solidFill>
-                        <a:schemeClr val="accent3">
-                          <a:lumMod val="25000"/>
-                        </a:schemeClr>
-                      </a:solidFill>
-                      <a:prstDash val="solid"/>
-                      <a:round/>
-                      <a:headEnd type="none" w="med" len="med"/>
-                      <a:tailEnd type="none" w="med" len="med"/>
-                    </a:lnL>
-                    <a:lnR w="12700" cap="flat" cmpd="sng" algn="ctr">
-                      <a:solidFill>
-                        <a:schemeClr val="accent3">
-                          <a:lumMod val="25000"/>
-                        </a:schemeClr>
-                      </a:solidFill>
-                      <a:prstDash val="solid"/>
-                      <a:round/>
-                      <a:headEnd type="none" w="med" len="med"/>
-                      <a:tailEnd type="none" w="med" len="med"/>
-                    </a:lnR>
-                    <a:lnT w="12700" cap="flat" cmpd="sng" algn="ctr">
-                      <a:solidFill>
-                        <a:schemeClr val="accent3">
-                          <a:lumMod val="25000"/>
-                        </a:schemeClr>
-                      </a:solidFill>
-                      <a:prstDash val="solid"/>
-                      <a:round/>
-                      <a:headEnd type="none" w="med" len="med"/>
-                      <a:tailEnd type="none" w="med" len="med"/>
-                    </a:lnT>
-                    <a:lnB w="12700" cap="flat" cmpd="sng" algn="ctr">
-                      <a:solidFill>
-                        <a:schemeClr val="accent3">
-                          <a:lumMod val="25000"/>
-                        </a:schemeClr>
-                      </a:solidFill>
-                      <a:prstDash val="solid"/>
-                      <a:round/>
-                      <a:headEnd type="none" w="med" len="med"/>
-                      <a:tailEnd type="none" w="med" len="med"/>
-                    </a:lnB>
-                    <a:lnTlToBr w="12700" cmpd="sng">
-                      <a:noFill/>
-                      <a:prstDash val="solid"/>
-                    </a:lnTlToBr>
-                    <a:lnBlToTr w="12700" cmpd="sng">
-                      <a:noFill/>
-                      <a:prstDash val="solid"/>
-                    </a:lnBlToTr>
-                    <a:solidFill>
-                      <a:schemeClr val="bg1">
-                        <a:alpha val="30000"/>
-                      </a:schemeClr>
-                    </a:solidFill>
-                  </a:tcPr>
-                </a:tc>
-                <a:tc>
-                  <a:txBody>
-                    <a:bodyPr/>
-                    <a:lstStyle/>
-                    <a:p>
-                      <a:pPr algn="ctr"/>
-                      <a:r>
-                        <a:rPr lang="en-US" sz="1600" b="0" i="0" dirty="0">
-                          <a:solidFill>
-                            <a:schemeClr val="bg1"/>
-                          </a:solidFill>
-                          <a:latin typeface="Segoe UI Light" panose="020B0502040204020203" pitchFamily="34" charset="0"/>
-                          <a:cs typeface="Segoe UI Light" panose="020B0502040204020203" pitchFamily="34" charset="0"/>
-                        </a:rPr>
-                        <a:t>2.3</a:t>
-                      </a:r>
-                    </a:p>
-                  </a:txBody>
-                  <a:tcPr anchor="ctr">
-                    <a:lnL w="12700" cap="flat" cmpd="sng" algn="ctr">
-                      <a:solidFill>
-                        <a:schemeClr val="accent3">
-                          <a:lumMod val="25000"/>
-                        </a:schemeClr>
-                      </a:solidFill>
-                      <a:prstDash val="solid"/>
-                      <a:round/>
-                      <a:headEnd type="none" w="med" len="med"/>
-                      <a:tailEnd type="none" w="med" len="med"/>
-                    </a:lnL>
-                    <a:lnR w="12700" cap="flat" cmpd="sng" algn="ctr">
-                      <a:solidFill>
-                        <a:schemeClr val="accent3">
-                          <a:lumMod val="25000"/>
-                        </a:schemeClr>
-                      </a:solidFill>
-                      <a:prstDash val="solid"/>
-                      <a:round/>
-                      <a:headEnd type="none" w="med" len="med"/>
-                      <a:tailEnd type="none" w="med" len="med"/>
-                    </a:lnR>
-                    <a:lnT w="12700" cap="flat" cmpd="sng" algn="ctr">
-                      <a:solidFill>
-                        <a:schemeClr val="accent3">
-                          <a:lumMod val="25000"/>
-                        </a:schemeClr>
-                      </a:solidFill>
-                      <a:prstDash val="solid"/>
-                      <a:round/>
-                      <a:headEnd type="none" w="med" len="med"/>
-                      <a:tailEnd type="none" w="med" len="med"/>
-                    </a:lnT>
-                    <a:lnB w="12700" cap="flat" cmpd="sng" algn="ctr">
-                      <a:solidFill>
-                        <a:schemeClr val="accent3">
-                          <a:lumMod val="25000"/>
-                        </a:schemeClr>
-                      </a:solidFill>
-                      <a:prstDash val="solid"/>
-                      <a:round/>
-                      <a:headEnd type="none" w="med" len="med"/>
-                      <a:tailEnd type="none" w="med" len="med"/>
-                    </a:lnB>
-                    <a:lnTlToBr w="12700" cmpd="sng">
-                      <a:noFill/>
-                      <a:prstDash val="solid"/>
-                    </a:lnTlToBr>
-                    <a:lnBlToTr w="12700" cmpd="sng">
-                      <a:noFill/>
-                      <a:prstDash val="solid"/>
-                    </a:lnBlToTr>
-                    <a:solidFill>
-                      <a:schemeClr val="bg1">
-                        <a:alpha val="30000"/>
-                      </a:schemeClr>
-                    </a:solidFill>
-                  </a:tcPr>
-                </a:tc>
-                <a:tc>
-                  <a:txBody>
-                    <a:bodyPr/>
-                    <a:lstStyle/>
-                    <a:p>
-                      <a:pPr algn="ctr"/>
-                      <a:r>
-                        <a:rPr lang="en-US" sz="1600" b="0" i="0" dirty="0">
-                          <a:solidFill>
-                            <a:schemeClr val="bg1"/>
-                          </a:solidFill>
-                          <a:latin typeface="Segoe UI Light" panose="020B0502040204020203" pitchFamily="34" charset="0"/>
-                          <a:cs typeface="Segoe UI Light" panose="020B0502040204020203" pitchFamily="34" charset="0"/>
-                        </a:rPr>
-                        <a:t>1.7</a:t>
-                      </a:r>
-                    </a:p>
-                  </a:txBody>
-                  <a:tcPr anchor="ctr">
-                    <a:lnL w="12700" cap="flat" cmpd="sng" algn="ctr">
-                      <a:solidFill>
-                        <a:schemeClr val="accent3">
-                          <a:lumMod val="25000"/>
-                        </a:schemeClr>
-                      </a:solidFill>
-                      <a:prstDash val="solid"/>
-                      <a:round/>
-                      <a:headEnd type="none" w="med" len="med"/>
-                      <a:tailEnd type="none" w="med" len="med"/>
-                    </a:lnL>
-                    <a:lnR w="12700" cap="flat" cmpd="sng" algn="ctr">
-                      <a:solidFill>
-                        <a:schemeClr val="accent3">
-                          <a:lumMod val="25000"/>
-                        </a:schemeClr>
-                      </a:solidFill>
-                      <a:prstDash val="solid"/>
-                      <a:round/>
-                      <a:headEnd type="none" w="med" len="med"/>
-                      <a:tailEnd type="none" w="med" len="med"/>
-                    </a:lnR>
-                    <a:lnT w="12700" cap="flat" cmpd="sng" algn="ctr">
-                      <a:solidFill>
-                        <a:schemeClr val="accent3">
-                          <a:lumMod val="25000"/>
-                        </a:schemeClr>
-                      </a:solidFill>
-                      <a:prstDash val="solid"/>
-                      <a:round/>
-                      <a:headEnd type="none" w="med" len="med"/>
-                      <a:tailEnd type="none" w="med" len="med"/>
-                    </a:lnT>
-                    <a:lnB w="12700" cap="flat" cmpd="sng" algn="ctr">
-                      <a:solidFill>
-                        <a:schemeClr val="accent3">
-                          <a:lumMod val="25000"/>
-                        </a:schemeClr>
-                      </a:solidFill>
-                      <a:prstDash val="solid"/>
-                      <a:round/>
-                      <a:headEnd type="none" w="med" len="med"/>
-                      <a:tailEnd type="none" w="med" len="med"/>
-                    </a:lnB>
-                    <a:lnTlToBr w="12700" cmpd="sng">
-                      <a:noFill/>
-                      <a:prstDash val="solid"/>
-                    </a:lnTlToBr>
-                    <a:lnBlToTr w="12700" cmpd="sng">
-                      <a:noFill/>
-                      <a:prstDash val="solid"/>
-                    </a:lnBlToTr>
-                    <a:solidFill>
-                      <a:schemeClr val="bg1">
-                        <a:alpha val="30000"/>
-                      </a:schemeClr>
-                    </a:solidFill>
-                  </a:tcPr>
-                </a:tc>
-                <a:tc>
-                  <a:txBody>
-                    <a:bodyPr/>
-                    <a:lstStyle/>
-                    <a:p>
-                      <a:pPr algn="ctr"/>
-                      <a:r>
-                        <a:rPr lang="en-US" sz="1600" b="0" i="0" dirty="0">
-                          <a:solidFill>
-                            <a:schemeClr val="bg1"/>
-                          </a:solidFill>
-                          <a:latin typeface="Segoe UI Light" panose="020B0502040204020203" pitchFamily="34" charset="0"/>
-                          <a:cs typeface="Segoe UI Light" panose="020B0502040204020203" pitchFamily="34" charset="0"/>
-                        </a:rPr>
-                        <a:t>5.0</a:t>
-                      </a:r>
-                    </a:p>
-                  </a:txBody>
-                  <a:tcPr anchor="ctr">
-                    <a:lnL w="12700" cap="flat" cmpd="sng" algn="ctr">
-                      <a:solidFill>
-                        <a:schemeClr val="accent3">
-                          <a:lumMod val="25000"/>
-                        </a:schemeClr>
-                      </a:solidFill>
-                      <a:prstDash val="solid"/>
-                      <a:round/>
-                      <a:headEnd type="none" w="med" len="med"/>
-                      <a:tailEnd type="none" w="med" len="med"/>
-                    </a:lnL>
-                    <a:lnR w="12700" cap="flat" cmpd="sng" algn="ctr">
-                      <a:solidFill>
-                        <a:schemeClr val="accent3">
-                          <a:lumMod val="25000"/>
-                        </a:schemeClr>
-                      </a:solidFill>
-                      <a:prstDash val="solid"/>
-                      <a:round/>
-                      <a:headEnd type="none" w="med" len="med"/>
-                      <a:tailEnd type="none" w="med" len="med"/>
-                    </a:lnR>
-                    <a:lnT w="12700" cap="flat" cmpd="sng" algn="ctr">
-                      <a:solidFill>
-                        <a:schemeClr val="accent3">
-                          <a:lumMod val="25000"/>
-                        </a:schemeClr>
-                      </a:solidFill>
-                      <a:prstDash val="solid"/>
-                      <a:round/>
-                      <a:headEnd type="none" w="med" len="med"/>
-                      <a:tailEnd type="none" w="med" len="med"/>
-                    </a:lnT>
-                    <a:lnB w="12700" cap="flat" cmpd="sng" algn="ctr">
-                      <a:solidFill>
-                        <a:schemeClr val="accent3">
-                          <a:lumMod val="25000"/>
-                        </a:schemeClr>
-                      </a:solidFill>
-                      <a:prstDash val="solid"/>
-                      <a:round/>
-                      <a:headEnd type="none" w="med" len="med"/>
-                      <a:tailEnd type="none" w="med" len="med"/>
-                    </a:lnB>
-                    <a:lnTlToBr w="12700" cmpd="sng">
-                      <a:noFill/>
-                      <a:prstDash val="solid"/>
-                    </a:lnTlToBr>
-                    <a:lnBlToTr w="12700" cmpd="sng">
-                      <a:noFill/>
-                      <a:prstDash val="solid"/>
-                    </a:lnBlToTr>
-                    <a:solidFill>
-                      <a:schemeClr val="bg1">
-                        <a:alpha val="30000"/>
-                      </a:schemeClr>
-                    </a:solidFill>
-                  </a:tcPr>
-                </a:tc>
-                <a:extLst>
-                  <a:ext uri="{0D108BD9-81ED-4DB2-BD59-A6C34878D82A}">
-                    <a16:rowId xmlns:a16="http://schemas.microsoft.com/office/drawing/2014/main" val="1760208656"/>
-                  </a:ext>
-                </a:extLst>
-              </a:tr>
-              <a:tr h="610590">
-                <a:tc>
-                  <a:txBody>
-                    <a:bodyPr/>
-                    <a:lstStyle/>
-                    <a:p>
-                      <a:pPr algn="ctr"/>
-                      <a:r>
-                        <a:rPr lang="en-US" sz="1600" b="0" i="0" dirty="0">
-                          <a:solidFill>
-                            <a:schemeClr val="bg1"/>
-                          </a:solidFill>
-                          <a:latin typeface="Segoe UI Light" panose="020B0502040204020203" pitchFamily="34" charset="0"/>
-                          <a:cs typeface="Segoe UI Light" panose="020B0502040204020203" pitchFamily="34" charset="0"/>
-                        </a:rPr>
-                        <a:t>Q2</a:t>
-                      </a:r>
-                    </a:p>
-                  </a:txBody>
-                  <a:tcPr anchor="ctr">
-                    <a:lnL w="12700" cap="flat" cmpd="sng" algn="ctr">
-                      <a:solidFill>
-                        <a:schemeClr val="accent3">
-                          <a:lumMod val="25000"/>
-                        </a:schemeClr>
-                      </a:solidFill>
-                      <a:prstDash val="solid"/>
-                      <a:round/>
-                      <a:headEnd type="none" w="med" len="med"/>
-                      <a:tailEnd type="none" w="med" len="med"/>
-                    </a:lnL>
-                    <a:lnR w="12700" cap="flat" cmpd="sng" algn="ctr">
-                      <a:solidFill>
-                        <a:schemeClr val="accent3">
-                          <a:lumMod val="25000"/>
-                        </a:schemeClr>
-                      </a:solidFill>
-                      <a:prstDash val="solid"/>
-                      <a:round/>
-                      <a:headEnd type="none" w="med" len="med"/>
-                      <a:tailEnd type="none" w="med" len="med"/>
-                    </a:lnR>
-                    <a:lnT w="12700" cap="flat" cmpd="sng" algn="ctr">
-                      <a:solidFill>
-                        <a:schemeClr val="accent3">
-                          <a:lumMod val="25000"/>
-                        </a:schemeClr>
-                      </a:solidFill>
-                      <a:prstDash val="solid"/>
-                      <a:round/>
-                      <a:headEnd type="none" w="med" len="med"/>
-                      <a:tailEnd type="none" w="med" len="med"/>
-                    </a:lnT>
-                    <a:lnB w="12700" cap="flat" cmpd="sng" algn="ctr">
-                      <a:solidFill>
-                        <a:schemeClr val="accent3">
-                          <a:lumMod val="25000"/>
-                        </a:schemeClr>
-                      </a:solidFill>
-                      <a:prstDash val="solid"/>
-                      <a:round/>
-                      <a:headEnd type="none" w="med" len="med"/>
-                      <a:tailEnd type="none" w="med" len="med"/>
-                    </a:lnB>
-                    <a:lnTlToBr w="12700" cmpd="sng">
-                      <a:noFill/>
-                      <a:prstDash val="solid"/>
-                    </a:lnTlToBr>
-                    <a:lnBlToTr w="12700" cmpd="sng">
-                      <a:noFill/>
-                      <a:prstDash val="solid"/>
-                    </a:lnBlToTr>
-                    <a:solidFill>
-                      <a:schemeClr val="bg1">
-                        <a:alpha val="40000"/>
-                      </a:schemeClr>
-                    </a:solidFill>
-                  </a:tcPr>
-                </a:tc>
-                <a:tc>
-                  <a:txBody>
-                    <a:bodyPr/>
-                    <a:lstStyle/>
-                    <a:p>
-                      <a:pPr algn="ctr"/>
-                      <a:r>
-                        <a:rPr lang="en-US" sz="1600" b="0" i="0" dirty="0">
-                          <a:solidFill>
-                            <a:schemeClr val="bg1"/>
-                          </a:solidFill>
-                          <a:latin typeface="Segoe UI Light" panose="020B0502040204020203" pitchFamily="34" charset="0"/>
-                          <a:cs typeface="Segoe UI Light" panose="020B0502040204020203" pitchFamily="34" charset="0"/>
-                        </a:rPr>
-                        <a:t>3.2</a:t>
-                      </a:r>
-                    </a:p>
-                  </a:txBody>
-                  <a:tcPr anchor="ctr">
-                    <a:lnL w="12700" cap="flat" cmpd="sng" algn="ctr">
-                      <a:solidFill>
-                        <a:schemeClr val="accent3">
-                          <a:lumMod val="25000"/>
-                        </a:schemeClr>
-                      </a:solidFill>
-                      <a:prstDash val="solid"/>
-                      <a:round/>
-                      <a:headEnd type="none" w="med" len="med"/>
-                      <a:tailEnd type="none" w="med" len="med"/>
-                    </a:lnL>
-                    <a:lnR w="12700" cap="flat" cmpd="sng" algn="ctr">
-                      <a:solidFill>
-                        <a:schemeClr val="accent3">
-                          <a:lumMod val="25000"/>
-                        </a:schemeClr>
-                      </a:solidFill>
-                      <a:prstDash val="solid"/>
-                      <a:round/>
-                      <a:headEnd type="none" w="med" len="med"/>
-                      <a:tailEnd type="none" w="med" len="med"/>
-                    </a:lnR>
-                    <a:lnT w="12700" cap="flat" cmpd="sng" algn="ctr">
-                      <a:solidFill>
-                        <a:schemeClr val="accent3">
-                          <a:lumMod val="25000"/>
-                        </a:schemeClr>
-                      </a:solidFill>
-                      <a:prstDash val="solid"/>
-                      <a:round/>
-                      <a:headEnd type="none" w="med" len="med"/>
-                      <a:tailEnd type="none" w="med" len="med"/>
-                    </a:lnT>
-                    <a:lnB w="12700" cap="flat" cmpd="sng" algn="ctr">
-                      <a:solidFill>
-                        <a:schemeClr val="accent3">
-                          <a:lumMod val="25000"/>
-                        </a:schemeClr>
-                      </a:solidFill>
-                      <a:prstDash val="solid"/>
-                      <a:round/>
-                      <a:headEnd type="none" w="med" len="med"/>
-                      <a:tailEnd type="none" w="med" len="med"/>
-                    </a:lnB>
-                    <a:lnTlToBr w="12700" cmpd="sng">
-                      <a:noFill/>
-                      <a:prstDash val="solid"/>
-                    </a:lnTlToBr>
-                    <a:lnBlToTr w="12700" cmpd="sng">
-                      <a:noFill/>
-                      <a:prstDash val="solid"/>
-                    </a:lnBlToTr>
-                    <a:solidFill>
-                      <a:schemeClr val="bg1">
-                        <a:alpha val="40000"/>
-                      </a:schemeClr>
-                    </a:solidFill>
-                  </a:tcPr>
-                </a:tc>
-                <a:tc>
-                  <a:txBody>
-                    <a:bodyPr/>
-                    <a:lstStyle/>
-                    <a:p>
-                      <a:pPr algn="ctr"/>
-                      <a:r>
-                        <a:rPr lang="en-US" sz="1600" b="0" i="0" dirty="0">
-                          <a:solidFill>
-                            <a:schemeClr val="bg1"/>
-                          </a:solidFill>
-                          <a:latin typeface="Segoe UI Light" panose="020B0502040204020203" pitchFamily="34" charset="0"/>
-                          <a:cs typeface="Segoe UI Light" panose="020B0502040204020203" pitchFamily="34" charset="0"/>
-                        </a:rPr>
-                        <a:t>5.1</a:t>
-                      </a:r>
-                    </a:p>
-                  </a:txBody>
-                  <a:tcPr anchor="ctr">
-                    <a:lnL w="12700" cap="flat" cmpd="sng" algn="ctr">
-                      <a:solidFill>
-                        <a:schemeClr val="accent3">
-                          <a:lumMod val="25000"/>
-                        </a:schemeClr>
-                      </a:solidFill>
-                      <a:prstDash val="solid"/>
-                      <a:round/>
-                      <a:headEnd type="none" w="med" len="med"/>
-                      <a:tailEnd type="none" w="med" len="med"/>
-                    </a:lnL>
-                    <a:lnR w="12700" cap="flat" cmpd="sng" algn="ctr">
-                      <a:solidFill>
-                        <a:schemeClr val="accent3">
-                          <a:lumMod val="25000"/>
-                        </a:schemeClr>
-                      </a:solidFill>
-                      <a:prstDash val="solid"/>
-                      <a:round/>
-                      <a:headEnd type="none" w="med" len="med"/>
-                      <a:tailEnd type="none" w="med" len="med"/>
-                    </a:lnR>
-                    <a:lnT w="12700" cap="flat" cmpd="sng" algn="ctr">
-                      <a:solidFill>
-                        <a:schemeClr val="accent3">
-                          <a:lumMod val="25000"/>
-                        </a:schemeClr>
-                      </a:solidFill>
-                      <a:prstDash val="solid"/>
-                      <a:round/>
-                      <a:headEnd type="none" w="med" len="med"/>
-                      <a:tailEnd type="none" w="med" len="med"/>
-                    </a:lnT>
-                    <a:lnB w="12700" cap="flat" cmpd="sng" algn="ctr">
-                      <a:solidFill>
-                        <a:schemeClr val="accent3">
-                          <a:lumMod val="25000"/>
-                        </a:schemeClr>
-                      </a:solidFill>
-                      <a:prstDash val="solid"/>
-                      <a:round/>
-                      <a:headEnd type="none" w="med" len="med"/>
-                      <a:tailEnd type="none" w="med" len="med"/>
-                    </a:lnB>
-                    <a:lnTlToBr w="12700" cmpd="sng">
-                      <a:noFill/>
-                      <a:prstDash val="solid"/>
-                    </a:lnTlToBr>
-                    <a:lnBlToTr w="12700" cmpd="sng">
-                      <a:noFill/>
-                      <a:prstDash val="solid"/>
-                    </a:lnBlToTr>
-                    <a:solidFill>
-                      <a:schemeClr val="bg1">
-                        <a:alpha val="40000"/>
-                      </a:schemeClr>
-                    </a:solidFill>
-                  </a:tcPr>
-                </a:tc>
-                <a:tc>
-                  <a:txBody>
-                    <a:bodyPr/>
-                    <a:lstStyle/>
-                    <a:p>
-                      <a:pPr algn="ctr"/>
-                      <a:r>
-                        <a:rPr lang="en-US" sz="1600" b="0" i="0" dirty="0">
-                          <a:solidFill>
-                            <a:schemeClr val="bg1"/>
-                          </a:solidFill>
-                          <a:latin typeface="Segoe UI Light" panose="020B0502040204020203" pitchFamily="34" charset="0"/>
-                          <a:cs typeface="Segoe UI Light" panose="020B0502040204020203" pitchFamily="34" charset="0"/>
-                        </a:rPr>
-                        <a:t>4.4</a:t>
-                      </a:r>
-                    </a:p>
-                  </a:txBody>
-                  <a:tcPr anchor="ctr">
-                    <a:lnL w="12700" cap="flat" cmpd="sng" algn="ctr">
-                      <a:solidFill>
-                        <a:schemeClr val="accent3">
-                          <a:lumMod val="25000"/>
-                        </a:schemeClr>
-                      </a:solidFill>
-                      <a:prstDash val="solid"/>
-                      <a:round/>
-                      <a:headEnd type="none" w="med" len="med"/>
-                      <a:tailEnd type="none" w="med" len="med"/>
-                    </a:lnL>
-                    <a:lnR w="12700" cap="flat" cmpd="sng" algn="ctr">
-                      <a:solidFill>
-                        <a:schemeClr val="accent3">
-                          <a:lumMod val="25000"/>
-                        </a:schemeClr>
-                      </a:solidFill>
-                      <a:prstDash val="solid"/>
-                      <a:round/>
-                      <a:headEnd type="none" w="med" len="med"/>
-                      <a:tailEnd type="none" w="med" len="med"/>
-                    </a:lnR>
-                    <a:lnT w="12700" cap="flat" cmpd="sng" algn="ctr">
-                      <a:solidFill>
-                        <a:schemeClr val="accent3">
-                          <a:lumMod val="25000"/>
-                        </a:schemeClr>
-                      </a:solidFill>
-                      <a:prstDash val="solid"/>
-                      <a:round/>
-                      <a:headEnd type="none" w="med" len="med"/>
-                      <a:tailEnd type="none" w="med" len="med"/>
-                    </a:lnT>
-                    <a:lnB w="12700" cap="flat" cmpd="sng" algn="ctr">
-                      <a:solidFill>
-                        <a:schemeClr val="accent3">
-                          <a:lumMod val="25000"/>
-                        </a:schemeClr>
-                      </a:solidFill>
-                      <a:prstDash val="solid"/>
-                      <a:round/>
-                      <a:headEnd type="none" w="med" len="med"/>
-                      <a:tailEnd type="none" w="med" len="med"/>
-                    </a:lnB>
-                    <a:lnTlToBr w="12700" cmpd="sng">
-                      <a:noFill/>
-                      <a:prstDash val="solid"/>
-                    </a:lnTlToBr>
-                    <a:lnBlToTr w="12700" cmpd="sng">
-                      <a:noFill/>
-                      <a:prstDash val="solid"/>
-                    </a:lnBlToTr>
-                    <a:solidFill>
-                      <a:schemeClr val="bg1">
-                        <a:alpha val="40000"/>
-                      </a:schemeClr>
-                    </a:solidFill>
-                  </a:tcPr>
-                </a:tc>
-                <a:tc>
-                  <a:txBody>
-                    <a:bodyPr/>
-                    <a:lstStyle/>
-                    <a:p>
-                      <a:pPr algn="ctr"/>
-                      <a:r>
-                        <a:rPr lang="en-US" sz="1600" b="0" i="0" dirty="0">
-                          <a:solidFill>
-                            <a:schemeClr val="bg1"/>
-                          </a:solidFill>
-                          <a:latin typeface="Segoe UI Light" panose="020B0502040204020203" pitchFamily="34" charset="0"/>
-                          <a:cs typeface="Segoe UI Light" panose="020B0502040204020203" pitchFamily="34" charset="0"/>
-                        </a:rPr>
-                        <a:t>3.0</a:t>
-                      </a:r>
-                    </a:p>
-                  </a:txBody>
-                  <a:tcPr anchor="ctr">
-                    <a:lnL w="12700" cap="flat" cmpd="sng" algn="ctr">
-                      <a:solidFill>
-                        <a:schemeClr val="accent3">
-                          <a:lumMod val="25000"/>
-                        </a:schemeClr>
-                      </a:solidFill>
-                      <a:prstDash val="solid"/>
-                      <a:round/>
-                      <a:headEnd type="none" w="med" len="med"/>
-                      <a:tailEnd type="none" w="med" len="med"/>
-                    </a:lnL>
-                    <a:lnR w="12700" cap="flat" cmpd="sng" algn="ctr">
-                      <a:solidFill>
-                        <a:schemeClr val="accent3">
-                          <a:lumMod val="25000"/>
-                        </a:schemeClr>
-                      </a:solidFill>
-                      <a:prstDash val="solid"/>
-                      <a:round/>
-                      <a:headEnd type="none" w="med" len="med"/>
-                      <a:tailEnd type="none" w="med" len="med"/>
-                    </a:lnR>
-                    <a:lnT w="12700" cap="flat" cmpd="sng" algn="ctr">
-                      <a:solidFill>
-                        <a:schemeClr val="accent3">
-                          <a:lumMod val="25000"/>
-                        </a:schemeClr>
-                      </a:solidFill>
-                      <a:prstDash val="solid"/>
-                      <a:round/>
-                      <a:headEnd type="none" w="med" len="med"/>
-                      <a:tailEnd type="none" w="med" len="med"/>
-                    </a:lnT>
-                    <a:lnB w="12700" cap="flat" cmpd="sng" algn="ctr">
-                      <a:solidFill>
-                        <a:schemeClr val="accent3">
-                          <a:lumMod val="25000"/>
-                        </a:schemeClr>
-                      </a:solidFill>
-                      <a:prstDash val="solid"/>
-                      <a:round/>
-                      <a:headEnd type="none" w="med" len="med"/>
-                      <a:tailEnd type="none" w="med" len="med"/>
-                    </a:lnB>
-                    <a:lnTlToBr w="12700" cmpd="sng">
-                      <a:noFill/>
-                      <a:prstDash val="solid"/>
-                    </a:lnTlToBr>
-                    <a:lnBlToTr w="12700" cmpd="sng">
-                      <a:noFill/>
-                      <a:prstDash val="solid"/>
-                    </a:lnBlToTr>
-                    <a:solidFill>
-                      <a:schemeClr val="bg1">
-                        <a:alpha val="40000"/>
-                      </a:schemeClr>
-                    </a:solidFill>
-                  </a:tcPr>
-                </a:tc>
-                <a:extLst>
-                  <a:ext uri="{0D108BD9-81ED-4DB2-BD59-A6C34878D82A}">
-                    <a16:rowId xmlns:a16="http://schemas.microsoft.com/office/drawing/2014/main" val="3634243071"/>
-                  </a:ext>
-                </a:extLst>
-              </a:tr>
-              <a:tr h="627902">
-                <a:tc>
-                  <a:txBody>
-                    <a:bodyPr/>
-                    <a:lstStyle/>
-                    <a:p>
-                      <a:pPr algn="ctr"/>
-                      <a:r>
-                        <a:rPr lang="en-US" sz="1600" b="0" i="0" dirty="0">
-                          <a:solidFill>
-                            <a:schemeClr val="bg1"/>
-                          </a:solidFill>
-                          <a:latin typeface="Segoe UI Light" panose="020B0502040204020203" pitchFamily="34" charset="0"/>
-                          <a:cs typeface="Segoe UI Light" panose="020B0502040204020203" pitchFamily="34" charset="0"/>
-                        </a:rPr>
-                        <a:t>Q3</a:t>
-                      </a:r>
-                    </a:p>
-                  </a:txBody>
-                  <a:tcPr anchor="ctr">
-                    <a:lnL w="12700" cap="flat" cmpd="sng" algn="ctr">
-                      <a:solidFill>
-                        <a:schemeClr val="accent3">
-                          <a:lumMod val="25000"/>
-                        </a:schemeClr>
-                      </a:solidFill>
-                      <a:prstDash val="solid"/>
-                      <a:round/>
-                      <a:headEnd type="none" w="med" len="med"/>
-                      <a:tailEnd type="none" w="med" len="med"/>
-                    </a:lnL>
-                    <a:lnR w="12700" cap="flat" cmpd="sng" algn="ctr">
-                      <a:solidFill>
-                        <a:schemeClr val="accent3">
-                          <a:lumMod val="25000"/>
-                        </a:schemeClr>
-                      </a:solidFill>
-                      <a:prstDash val="solid"/>
-                      <a:round/>
-                      <a:headEnd type="none" w="med" len="med"/>
-                      <a:tailEnd type="none" w="med" len="med"/>
-                    </a:lnR>
-                    <a:lnT w="12700" cap="flat" cmpd="sng" algn="ctr">
-                      <a:solidFill>
-                        <a:schemeClr val="accent3">
-                          <a:lumMod val="25000"/>
-                        </a:schemeClr>
-                      </a:solidFill>
-                      <a:prstDash val="solid"/>
-                      <a:round/>
-                      <a:headEnd type="none" w="med" len="med"/>
-                      <a:tailEnd type="none" w="med" len="med"/>
-                    </a:lnT>
-                    <a:lnB w="12700" cap="flat" cmpd="sng" algn="ctr">
-                      <a:solidFill>
-                        <a:schemeClr val="accent3">
-                          <a:lumMod val="25000"/>
-                        </a:schemeClr>
-                      </a:solidFill>
-                      <a:prstDash val="solid"/>
-                      <a:round/>
-                      <a:headEnd type="none" w="med" len="med"/>
-                      <a:tailEnd type="none" w="med" len="med"/>
-                    </a:lnB>
-                    <a:lnTlToBr w="12700" cmpd="sng">
-                      <a:noFill/>
-                      <a:prstDash val="solid"/>
-                    </a:lnTlToBr>
-                    <a:lnBlToTr w="12700" cmpd="sng">
-                      <a:noFill/>
-                      <a:prstDash val="solid"/>
-                    </a:lnBlToTr>
-                    <a:solidFill>
-                      <a:schemeClr val="bg1">
-                        <a:alpha val="30000"/>
-                      </a:schemeClr>
-                    </a:solidFill>
-                  </a:tcPr>
-                </a:tc>
-                <a:tc>
-                  <a:txBody>
-                    <a:bodyPr/>
-                    <a:lstStyle/>
-                    <a:p>
-                      <a:pPr algn="ctr"/>
-                      <a:r>
-                        <a:rPr lang="en-US" sz="1600" b="0" i="0" dirty="0">
-                          <a:solidFill>
-                            <a:schemeClr val="bg1"/>
-                          </a:solidFill>
-                          <a:latin typeface="Segoe UI Light" panose="020B0502040204020203" pitchFamily="34" charset="0"/>
-                          <a:cs typeface="Segoe UI Light" panose="020B0502040204020203" pitchFamily="34" charset="0"/>
-                        </a:rPr>
-                        <a:t>2.1</a:t>
-                      </a:r>
-                    </a:p>
-                  </a:txBody>
-                  <a:tcPr anchor="ctr">
-                    <a:lnL w="12700" cap="flat" cmpd="sng" algn="ctr">
-                      <a:solidFill>
-                        <a:schemeClr val="accent3">
-                          <a:lumMod val="25000"/>
-                        </a:schemeClr>
-                      </a:solidFill>
-                      <a:prstDash val="solid"/>
-                      <a:round/>
-                      <a:headEnd type="none" w="med" len="med"/>
-                      <a:tailEnd type="none" w="med" len="med"/>
-                    </a:lnL>
-                    <a:lnR w="12700" cap="flat" cmpd="sng" algn="ctr">
-                      <a:solidFill>
-                        <a:schemeClr val="accent3">
-                          <a:lumMod val="25000"/>
-                        </a:schemeClr>
-                      </a:solidFill>
-                      <a:prstDash val="solid"/>
-                      <a:round/>
-                      <a:headEnd type="none" w="med" len="med"/>
-                      <a:tailEnd type="none" w="med" len="med"/>
-                    </a:lnR>
-                    <a:lnT w="12700" cap="flat" cmpd="sng" algn="ctr">
-                      <a:solidFill>
-                        <a:schemeClr val="accent3">
-                          <a:lumMod val="25000"/>
-                        </a:schemeClr>
-                      </a:solidFill>
-                      <a:prstDash val="solid"/>
-                      <a:round/>
-                      <a:headEnd type="none" w="med" len="med"/>
-                      <a:tailEnd type="none" w="med" len="med"/>
-                    </a:lnT>
-                    <a:lnB w="12700" cap="flat" cmpd="sng" algn="ctr">
-                      <a:solidFill>
-                        <a:schemeClr val="accent3">
-                          <a:lumMod val="25000"/>
-                        </a:schemeClr>
-                      </a:solidFill>
-                      <a:prstDash val="solid"/>
-                      <a:round/>
-                      <a:headEnd type="none" w="med" len="med"/>
-                      <a:tailEnd type="none" w="med" len="med"/>
-                    </a:lnB>
-                    <a:lnTlToBr w="12700" cmpd="sng">
-                      <a:noFill/>
-                      <a:prstDash val="solid"/>
-                    </a:lnTlToBr>
-                    <a:lnBlToTr w="12700" cmpd="sng">
-                      <a:noFill/>
-                      <a:prstDash val="solid"/>
-                    </a:lnBlToTr>
-                    <a:solidFill>
-                      <a:schemeClr val="bg1">
-                        <a:alpha val="30000"/>
-                      </a:schemeClr>
-                    </a:solidFill>
-                  </a:tcPr>
-                </a:tc>
-                <a:tc>
-                  <a:txBody>
-                    <a:bodyPr/>
-                    <a:lstStyle/>
-                    <a:p>
-                      <a:pPr algn="ctr"/>
-                      <a:r>
-                        <a:rPr lang="en-US" sz="1600" b="0" i="0" dirty="0">
-                          <a:solidFill>
-                            <a:schemeClr val="bg1"/>
-                          </a:solidFill>
-                          <a:latin typeface="Segoe UI Light" panose="020B0502040204020203" pitchFamily="34" charset="0"/>
-                          <a:cs typeface="Segoe UI Light" panose="020B0502040204020203" pitchFamily="34" charset="0"/>
-                        </a:rPr>
-                        <a:t>1.7</a:t>
-                      </a:r>
-                    </a:p>
-                  </a:txBody>
-                  <a:tcPr anchor="ctr">
-                    <a:lnL w="12700" cap="flat" cmpd="sng" algn="ctr">
-                      <a:solidFill>
-                        <a:schemeClr val="accent3">
-                          <a:lumMod val="25000"/>
-                        </a:schemeClr>
-                      </a:solidFill>
-                      <a:prstDash val="solid"/>
-                      <a:round/>
-                      <a:headEnd type="none" w="med" len="med"/>
-                      <a:tailEnd type="none" w="med" len="med"/>
-                    </a:lnL>
-                    <a:lnR w="12700" cap="flat" cmpd="sng" algn="ctr">
-                      <a:solidFill>
-                        <a:schemeClr val="accent3">
-                          <a:lumMod val="25000"/>
-                        </a:schemeClr>
-                      </a:solidFill>
-                      <a:prstDash val="solid"/>
-                      <a:round/>
-                      <a:headEnd type="none" w="med" len="med"/>
-                      <a:tailEnd type="none" w="med" len="med"/>
-                    </a:lnR>
-                    <a:lnT w="12700" cap="flat" cmpd="sng" algn="ctr">
-                      <a:solidFill>
-                        <a:schemeClr val="accent3">
-                          <a:lumMod val="25000"/>
-                        </a:schemeClr>
-                      </a:solidFill>
-                      <a:prstDash val="solid"/>
-                      <a:round/>
-                      <a:headEnd type="none" w="med" len="med"/>
-                      <a:tailEnd type="none" w="med" len="med"/>
-                    </a:lnT>
-                    <a:lnB w="12700" cap="flat" cmpd="sng" algn="ctr">
-                      <a:solidFill>
-                        <a:schemeClr val="accent3">
-                          <a:lumMod val="25000"/>
-                        </a:schemeClr>
-                      </a:solidFill>
-                      <a:prstDash val="solid"/>
-                      <a:round/>
-                      <a:headEnd type="none" w="med" len="med"/>
-                      <a:tailEnd type="none" w="med" len="med"/>
-                    </a:lnB>
-                    <a:lnTlToBr w="12700" cmpd="sng">
-                      <a:noFill/>
-                      <a:prstDash val="solid"/>
-                    </a:lnTlToBr>
-                    <a:lnBlToTr w="12700" cmpd="sng">
-                      <a:noFill/>
-                      <a:prstDash val="solid"/>
-                    </a:lnBlToTr>
-                    <a:solidFill>
-                      <a:schemeClr val="bg1">
-                        <a:alpha val="30000"/>
-                      </a:schemeClr>
-                    </a:solidFill>
-                  </a:tcPr>
-                </a:tc>
-                <a:tc>
-                  <a:txBody>
-                    <a:bodyPr/>
-                    <a:lstStyle/>
-                    <a:p>
-                      <a:pPr algn="ctr"/>
-                      <a:r>
-                        <a:rPr lang="en-US" sz="1600" b="0" i="0" dirty="0">
-                          <a:solidFill>
-                            <a:schemeClr val="bg1"/>
-                          </a:solidFill>
-                          <a:latin typeface="Segoe UI Light" panose="020B0502040204020203" pitchFamily="34" charset="0"/>
-                          <a:cs typeface="Segoe UI Light" panose="020B0502040204020203" pitchFamily="34" charset="0"/>
-                        </a:rPr>
-                        <a:t>2.5</a:t>
-                      </a:r>
-                    </a:p>
-                  </a:txBody>
-                  <a:tcPr anchor="ctr">
-                    <a:lnL w="12700" cap="flat" cmpd="sng" algn="ctr">
-                      <a:solidFill>
-                        <a:schemeClr val="accent3">
-                          <a:lumMod val="25000"/>
-                        </a:schemeClr>
-                      </a:solidFill>
-                      <a:prstDash val="solid"/>
-                      <a:round/>
-                      <a:headEnd type="none" w="med" len="med"/>
-                      <a:tailEnd type="none" w="med" len="med"/>
-                    </a:lnL>
-                    <a:lnR w="12700" cap="flat" cmpd="sng" algn="ctr">
-                      <a:solidFill>
-                        <a:schemeClr val="accent3">
-                          <a:lumMod val="25000"/>
-                        </a:schemeClr>
-                      </a:solidFill>
-                      <a:prstDash val="solid"/>
-                      <a:round/>
-                      <a:headEnd type="none" w="med" len="med"/>
-                      <a:tailEnd type="none" w="med" len="med"/>
-                    </a:lnR>
-                    <a:lnT w="12700" cap="flat" cmpd="sng" algn="ctr">
-                      <a:solidFill>
-                        <a:schemeClr val="accent3">
-                          <a:lumMod val="25000"/>
-                        </a:schemeClr>
-                      </a:solidFill>
-                      <a:prstDash val="solid"/>
-                      <a:round/>
-                      <a:headEnd type="none" w="med" len="med"/>
-                      <a:tailEnd type="none" w="med" len="med"/>
-                    </a:lnT>
-                    <a:lnB w="12700" cap="flat" cmpd="sng" algn="ctr">
-                      <a:solidFill>
-                        <a:schemeClr val="accent3">
-                          <a:lumMod val="25000"/>
-                        </a:schemeClr>
-                      </a:solidFill>
-                      <a:prstDash val="solid"/>
-                      <a:round/>
-                      <a:headEnd type="none" w="med" len="med"/>
-                      <a:tailEnd type="none" w="med" len="med"/>
-                    </a:lnB>
-                    <a:lnTlToBr w="12700" cmpd="sng">
-                      <a:noFill/>
-                      <a:prstDash val="solid"/>
-                    </a:lnTlToBr>
-                    <a:lnBlToTr w="12700" cmpd="sng">
-                      <a:noFill/>
-                      <a:prstDash val="solid"/>
-                    </a:lnBlToTr>
-                    <a:solidFill>
-                      <a:schemeClr val="bg1">
-                        <a:alpha val="30000"/>
-                      </a:schemeClr>
-                    </a:solidFill>
-                  </a:tcPr>
-                </a:tc>
-                <a:tc>
-                  <a:txBody>
-                    <a:bodyPr/>
-                    <a:lstStyle/>
-                    <a:p>
-                      <a:pPr algn="ctr"/>
-                      <a:r>
-                        <a:rPr lang="en-US" sz="1600" b="0" i="0" dirty="0">
-                          <a:solidFill>
-                            <a:schemeClr val="bg1"/>
-                          </a:solidFill>
-                          <a:latin typeface="Segoe UI Light" panose="020B0502040204020203" pitchFamily="34" charset="0"/>
-                          <a:cs typeface="Segoe UI Light" panose="020B0502040204020203" pitchFamily="34" charset="0"/>
-                        </a:rPr>
-                        <a:t>2.8</a:t>
-                      </a:r>
-                    </a:p>
-                  </a:txBody>
-                  <a:tcPr anchor="ctr">
-                    <a:lnL w="12700" cap="flat" cmpd="sng" algn="ctr">
-                      <a:solidFill>
-                        <a:schemeClr val="accent3">
-                          <a:lumMod val="25000"/>
-                        </a:schemeClr>
-                      </a:solidFill>
-                      <a:prstDash val="solid"/>
-                      <a:round/>
-                      <a:headEnd type="none" w="med" len="med"/>
-                      <a:tailEnd type="none" w="med" len="med"/>
-                    </a:lnL>
-                    <a:lnR w="12700" cap="flat" cmpd="sng" algn="ctr">
-                      <a:solidFill>
-                        <a:schemeClr val="accent3">
-                          <a:lumMod val="25000"/>
-                        </a:schemeClr>
-                      </a:solidFill>
-                      <a:prstDash val="solid"/>
-                      <a:round/>
-                      <a:headEnd type="none" w="med" len="med"/>
-                      <a:tailEnd type="none" w="med" len="med"/>
-                    </a:lnR>
-                    <a:lnT w="12700" cap="flat" cmpd="sng" algn="ctr">
-                      <a:solidFill>
-                        <a:schemeClr val="accent3">
-                          <a:lumMod val="25000"/>
-                        </a:schemeClr>
-                      </a:solidFill>
-                      <a:prstDash val="solid"/>
-                      <a:round/>
-                      <a:headEnd type="none" w="med" len="med"/>
-                      <a:tailEnd type="none" w="med" len="med"/>
-                    </a:lnT>
-                    <a:lnB w="12700" cap="flat" cmpd="sng" algn="ctr">
-                      <a:solidFill>
-                        <a:schemeClr val="accent3">
-                          <a:lumMod val="25000"/>
-                        </a:schemeClr>
-                      </a:solidFill>
-                      <a:prstDash val="solid"/>
-                      <a:round/>
-                      <a:headEnd type="none" w="med" len="med"/>
-                      <a:tailEnd type="none" w="med" len="med"/>
-                    </a:lnB>
-                    <a:lnTlToBr w="12700" cmpd="sng">
-                      <a:noFill/>
-                      <a:prstDash val="solid"/>
-                    </a:lnTlToBr>
-                    <a:lnBlToTr w="12700" cmpd="sng">
-                      <a:noFill/>
-                      <a:prstDash val="solid"/>
-                    </a:lnBlToTr>
-                    <a:solidFill>
-                      <a:schemeClr val="bg1">
-                        <a:alpha val="30000"/>
-                      </a:schemeClr>
-                    </a:solidFill>
-                  </a:tcPr>
-                </a:tc>
-                <a:extLst>
-                  <a:ext uri="{0D108BD9-81ED-4DB2-BD59-A6C34878D82A}">
-                    <a16:rowId xmlns:a16="http://schemas.microsoft.com/office/drawing/2014/main" val="415808797"/>
-                  </a:ext>
-                </a:extLst>
-              </a:tr>
-              <a:tr h="659806">
-                <a:tc>
-                  <a:txBody>
-                    <a:bodyPr/>
-                    <a:lstStyle/>
-                    <a:p>
-                      <a:pPr algn="ctr"/>
-                      <a:r>
-                        <a:rPr lang="en-US" sz="1600" b="0" i="0" dirty="0">
-                          <a:solidFill>
-                            <a:schemeClr val="bg1"/>
-                          </a:solidFill>
-                          <a:latin typeface="Segoe UI Light" panose="020B0502040204020203" pitchFamily="34" charset="0"/>
-                          <a:cs typeface="Segoe UI Light" panose="020B0502040204020203" pitchFamily="34" charset="0"/>
-                        </a:rPr>
-                        <a:t>Q4</a:t>
-                      </a:r>
-                    </a:p>
-                  </a:txBody>
-                  <a:tcPr anchor="ctr">
-                    <a:lnL w="12700" cap="flat" cmpd="sng" algn="ctr">
-                      <a:solidFill>
-                        <a:schemeClr val="accent3">
-                          <a:lumMod val="25000"/>
-                        </a:schemeClr>
-                      </a:solidFill>
-                      <a:prstDash val="solid"/>
-                      <a:round/>
-                      <a:headEnd type="none" w="med" len="med"/>
-                      <a:tailEnd type="none" w="med" len="med"/>
-                    </a:lnL>
-                    <a:lnR w="12700" cap="flat" cmpd="sng" algn="ctr">
-                      <a:solidFill>
-                        <a:schemeClr val="accent3">
-                          <a:lumMod val="25000"/>
-                        </a:schemeClr>
-                      </a:solidFill>
-                      <a:prstDash val="solid"/>
-                      <a:round/>
-                      <a:headEnd type="none" w="med" len="med"/>
-                      <a:tailEnd type="none" w="med" len="med"/>
-                    </a:lnR>
-                    <a:lnT w="12700" cap="flat" cmpd="sng" algn="ctr">
-                      <a:solidFill>
-                        <a:schemeClr val="accent3">
-                          <a:lumMod val="25000"/>
-                        </a:schemeClr>
-                      </a:solidFill>
-                      <a:prstDash val="solid"/>
-                      <a:round/>
-                      <a:headEnd type="none" w="med" len="med"/>
-                      <a:tailEnd type="none" w="med" len="med"/>
-                    </a:lnT>
-                    <a:lnB w="12700" cap="flat" cmpd="sng" algn="ctr">
-                      <a:solidFill>
-                        <a:schemeClr val="accent3">
-                          <a:lumMod val="25000"/>
-                        </a:schemeClr>
-                      </a:solidFill>
-                      <a:prstDash val="solid"/>
-                      <a:round/>
-                      <a:headEnd type="none" w="med" len="med"/>
-                      <a:tailEnd type="none" w="med" len="med"/>
-                    </a:lnB>
-                    <a:lnTlToBr w="12700" cmpd="sng">
-                      <a:noFill/>
-                      <a:prstDash val="solid"/>
-                    </a:lnTlToBr>
-                    <a:lnBlToTr w="12700" cmpd="sng">
-                      <a:noFill/>
-                      <a:prstDash val="solid"/>
-                    </a:lnBlToTr>
-                    <a:solidFill>
-                      <a:schemeClr val="bg1">
-                        <a:alpha val="40000"/>
-                      </a:schemeClr>
-                    </a:solidFill>
-                  </a:tcPr>
-                </a:tc>
-                <a:tc>
-                  <a:txBody>
-                    <a:bodyPr/>
-                    <a:lstStyle/>
-                    <a:p>
-                      <a:pPr algn="ctr"/>
-                      <a:r>
-                        <a:rPr lang="en-US" sz="1600" b="0" i="0" dirty="0">
-                          <a:solidFill>
-                            <a:schemeClr val="bg1"/>
-                          </a:solidFill>
-                          <a:latin typeface="Segoe UI Light" panose="020B0502040204020203" pitchFamily="34" charset="0"/>
-                          <a:cs typeface="Segoe UI Light" panose="020B0502040204020203" pitchFamily="34" charset="0"/>
-                        </a:rPr>
-                        <a:t>4.5</a:t>
-                      </a:r>
-                    </a:p>
-                  </a:txBody>
-                  <a:tcPr anchor="ctr">
-                    <a:lnL w="12700" cap="flat" cmpd="sng" algn="ctr">
-                      <a:solidFill>
-                        <a:schemeClr val="accent3">
-                          <a:lumMod val="25000"/>
-                        </a:schemeClr>
-                      </a:solidFill>
-                      <a:prstDash val="solid"/>
-                      <a:round/>
-                      <a:headEnd type="none" w="med" len="med"/>
-                      <a:tailEnd type="none" w="med" len="med"/>
-                    </a:lnL>
-                    <a:lnR w="12700" cap="flat" cmpd="sng" algn="ctr">
-                      <a:solidFill>
-                        <a:schemeClr val="accent3">
-                          <a:lumMod val="25000"/>
-                        </a:schemeClr>
-                      </a:solidFill>
-                      <a:prstDash val="solid"/>
-                      <a:round/>
-                      <a:headEnd type="none" w="med" len="med"/>
-                      <a:tailEnd type="none" w="med" len="med"/>
-                    </a:lnR>
-                    <a:lnT w="12700" cap="flat" cmpd="sng" algn="ctr">
-                      <a:solidFill>
-                        <a:schemeClr val="accent3">
-                          <a:lumMod val="25000"/>
-                        </a:schemeClr>
-                      </a:solidFill>
-                      <a:prstDash val="solid"/>
-                      <a:round/>
-                      <a:headEnd type="none" w="med" len="med"/>
-                      <a:tailEnd type="none" w="med" len="med"/>
-                    </a:lnT>
-                    <a:lnB w="12700" cap="flat" cmpd="sng" algn="ctr">
-                      <a:solidFill>
-                        <a:schemeClr val="accent3">
-                          <a:lumMod val="25000"/>
-                        </a:schemeClr>
-                      </a:solidFill>
-                      <a:prstDash val="solid"/>
-                      <a:round/>
-                      <a:headEnd type="none" w="med" len="med"/>
-                      <a:tailEnd type="none" w="med" len="med"/>
-                    </a:lnB>
-                    <a:lnTlToBr w="12700" cmpd="sng">
-                      <a:noFill/>
-                      <a:prstDash val="solid"/>
-                    </a:lnTlToBr>
-                    <a:lnBlToTr w="12700" cmpd="sng">
-                      <a:noFill/>
-                      <a:prstDash val="solid"/>
-                    </a:lnBlToTr>
-                    <a:solidFill>
-                      <a:schemeClr val="bg1">
-                        <a:alpha val="40000"/>
-                      </a:schemeClr>
-                    </a:solidFill>
-                  </a:tcPr>
-                </a:tc>
-                <a:tc>
-                  <a:txBody>
-                    <a:bodyPr/>
-                    <a:lstStyle/>
-                    <a:p>
-                      <a:pPr algn="ctr"/>
-                      <a:r>
-                        <a:rPr lang="en-US" sz="1600" b="0" i="0" dirty="0">
-                          <a:solidFill>
-                            <a:schemeClr val="bg1"/>
-                          </a:solidFill>
-                          <a:latin typeface="Segoe UI Light" panose="020B0502040204020203" pitchFamily="34" charset="0"/>
-                          <a:cs typeface="Segoe UI Light" panose="020B0502040204020203" pitchFamily="34" charset="0"/>
-                        </a:rPr>
-                        <a:t>2.2</a:t>
-                      </a:r>
-                    </a:p>
-                  </a:txBody>
-                  <a:tcPr anchor="ctr">
-                    <a:lnL w="12700" cap="flat" cmpd="sng" algn="ctr">
-                      <a:solidFill>
-                        <a:schemeClr val="accent3">
-                          <a:lumMod val="25000"/>
-                        </a:schemeClr>
-                      </a:solidFill>
-                      <a:prstDash val="solid"/>
-                      <a:round/>
-                      <a:headEnd type="none" w="med" len="med"/>
-                      <a:tailEnd type="none" w="med" len="med"/>
-                    </a:lnL>
-                    <a:lnR w="12700" cap="flat" cmpd="sng" algn="ctr">
-                      <a:solidFill>
-                        <a:schemeClr val="accent3">
-                          <a:lumMod val="25000"/>
-                        </a:schemeClr>
-                      </a:solidFill>
-                      <a:prstDash val="solid"/>
-                      <a:round/>
-                      <a:headEnd type="none" w="med" len="med"/>
-                      <a:tailEnd type="none" w="med" len="med"/>
-                    </a:lnR>
-                    <a:lnT w="12700" cap="flat" cmpd="sng" algn="ctr">
-                      <a:solidFill>
-                        <a:schemeClr val="accent3">
-                          <a:lumMod val="25000"/>
-                        </a:schemeClr>
-                      </a:solidFill>
-                      <a:prstDash val="solid"/>
-                      <a:round/>
-                      <a:headEnd type="none" w="med" len="med"/>
-                      <a:tailEnd type="none" w="med" len="med"/>
-                    </a:lnT>
-                    <a:lnB w="12700" cap="flat" cmpd="sng" algn="ctr">
-                      <a:solidFill>
-                        <a:schemeClr val="accent3">
-                          <a:lumMod val="25000"/>
-                        </a:schemeClr>
-                      </a:solidFill>
-                      <a:prstDash val="solid"/>
-                      <a:round/>
-                      <a:headEnd type="none" w="med" len="med"/>
-                      <a:tailEnd type="none" w="med" len="med"/>
-                    </a:lnB>
-                    <a:lnTlToBr w="12700" cmpd="sng">
-                      <a:noFill/>
-                      <a:prstDash val="solid"/>
-                    </a:lnTlToBr>
-                    <a:lnBlToTr w="12700" cmpd="sng">
-                      <a:noFill/>
-                      <a:prstDash val="solid"/>
-                    </a:lnBlToTr>
-                    <a:solidFill>
-                      <a:schemeClr val="bg1">
-                        <a:alpha val="40000"/>
-                      </a:schemeClr>
-                    </a:solidFill>
-                  </a:tcPr>
-                </a:tc>
-                <a:tc>
-                  <a:txBody>
-                    <a:bodyPr/>
-                    <a:lstStyle/>
-                    <a:p>
-                      <a:pPr algn="ctr"/>
-                      <a:r>
-                        <a:rPr lang="en-US" sz="1600" b="0" i="0" dirty="0">
-                          <a:solidFill>
-                            <a:schemeClr val="bg1"/>
-                          </a:solidFill>
-                          <a:latin typeface="Segoe UI Light" panose="020B0502040204020203" pitchFamily="34" charset="0"/>
-                          <a:cs typeface="Segoe UI Light" panose="020B0502040204020203" pitchFamily="34" charset="0"/>
-                        </a:rPr>
-                        <a:t>1.7</a:t>
-                      </a:r>
-                    </a:p>
-                  </a:txBody>
-                  <a:tcPr anchor="ctr">
-                    <a:lnL w="12700" cap="flat" cmpd="sng" algn="ctr">
-                      <a:solidFill>
-                        <a:schemeClr val="accent3">
-                          <a:lumMod val="25000"/>
-                        </a:schemeClr>
-                      </a:solidFill>
-                      <a:prstDash val="solid"/>
-                      <a:round/>
-                      <a:headEnd type="none" w="med" len="med"/>
-                      <a:tailEnd type="none" w="med" len="med"/>
-                    </a:lnL>
-                    <a:lnR w="12700" cap="flat" cmpd="sng" algn="ctr">
-                      <a:solidFill>
-                        <a:schemeClr val="accent3">
-                          <a:lumMod val="25000"/>
-                        </a:schemeClr>
-                      </a:solidFill>
-                      <a:prstDash val="solid"/>
-                      <a:round/>
-                      <a:headEnd type="none" w="med" len="med"/>
-                      <a:tailEnd type="none" w="med" len="med"/>
-                    </a:lnR>
-                    <a:lnT w="12700" cap="flat" cmpd="sng" algn="ctr">
-                      <a:solidFill>
-                        <a:schemeClr val="accent3">
-                          <a:lumMod val="25000"/>
-                        </a:schemeClr>
-                      </a:solidFill>
-                      <a:prstDash val="solid"/>
-                      <a:round/>
-                      <a:headEnd type="none" w="med" len="med"/>
-                      <a:tailEnd type="none" w="med" len="med"/>
-                    </a:lnT>
-                    <a:lnB w="12700" cap="flat" cmpd="sng" algn="ctr">
-                      <a:solidFill>
-                        <a:schemeClr val="accent3">
-                          <a:lumMod val="25000"/>
-                        </a:schemeClr>
-                      </a:solidFill>
-                      <a:prstDash val="solid"/>
-                      <a:round/>
-                      <a:headEnd type="none" w="med" len="med"/>
-                      <a:tailEnd type="none" w="med" len="med"/>
-                    </a:lnB>
-                    <a:lnTlToBr w="12700" cmpd="sng">
-                      <a:noFill/>
-                      <a:prstDash val="solid"/>
-                    </a:lnTlToBr>
-                    <a:lnBlToTr w="12700" cmpd="sng">
-                      <a:noFill/>
-                      <a:prstDash val="solid"/>
-                    </a:lnBlToTr>
-                    <a:solidFill>
-                      <a:schemeClr val="bg1">
-                        <a:alpha val="40000"/>
-                      </a:schemeClr>
-                    </a:solidFill>
-                  </a:tcPr>
-                </a:tc>
-                <a:tc>
-                  <a:txBody>
-                    <a:bodyPr/>
-                    <a:lstStyle/>
-                    <a:p>
-                      <a:pPr algn="ctr"/>
-                      <a:r>
-                        <a:rPr lang="en-US" sz="1600" b="0" i="0" dirty="0">
-                          <a:solidFill>
-                            <a:schemeClr val="bg1"/>
-                          </a:solidFill>
-                          <a:latin typeface="Segoe UI Light" panose="020B0502040204020203" pitchFamily="34" charset="0"/>
-                          <a:cs typeface="Segoe UI Light" panose="020B0502040204020203" pitchFamily="34" charset="0"/>
-                        </a:rPr>
-                        <a:t>7.0</a:t>
-                      </a:r>
-                    </a:p>
-                  </a:txBody>
-                  <a:tcPr anchor="ctr">
-                    <a:lnL w="12700" cap="flat" cmpd="sng" algn="ctr">
-                      <a:solidFill>
-                        <a:schemeClr val="accent3">
-                          <a:lumMod val="25000"/>
-                        </a:schemeClr>
-                      </a:solidFill>
-                      <a:prstDash val="solid"/>
-                      <a:round/>
-                      <a:headEnd type="none" w="med" len="med"/>
-                      <a:tailEnd type="none" w="med" len="med"/>
-                    </a:lnL>
-                    <a:lnR w="12700" cap="flat" cmpd="sng" algn="ctr">
-                      <a:solidFill>
-                        <a:schemeClr val="accent3">
-                          <a:lumMod val="25000"/>
-                        </a:schemeClr>
-                      </a:solidFill>
-                      <a:prstDash val="solid"/>
-                      <a:round/>
-                      <a:headEnd type="none" w="med" len="med"/>
-                      <a:tailEnd type="none" w="med" len="med"/>
-                    </a:lnR>
-                    <a:lnT w="12700" cap="flat" cmpd="sng" algn="ctr">
-                      <a:solidFill>
-                        <a:schemeClr val="accent3">
-                          <a:lumMod val="25000"/>
-                        </a:schemeClr>
-                      </a:solidFill>
-                      <a:prstDash val="solid"/>
-                      <a:round/>
-                      <a:headEnd type="none" w="med" len="med"/>
-                      <a:tailEnd type="none" w="med" len="med"/>
-                    </a:lnT>
-                    <a:lnB w="12700" cap="flat" cmpd="sng" algn="ctr">
-                      <a:solidFill>
-                        <a:schemeClr val="accent3">
-                          <a:lumMod val="25000"/>
-                        </a:schemeClr>
-                      </a:solidFill>
-                      <a:prstDash val="solid"/>
-                      <a:round/>
-                      <a:headEnd type="none" w="med" len="med"/>
-                      <a:tailEnd type="none" w="med" len="med"/>
-                    </a:lnB>
-                    <a:lnTlToBr w="12700" cmpd="sng">
-                      <a:noFill/>
-                      <a:prstDash val="solid"/>
-                    </a:lnTlToBr>
-                    <a:lnBlToTr w="12700" cmpd="sng">
-                      <a:noFill/>
-                      <a:prstDash val="solid"/>
-                    </a:lnBlToTr>
-                    <a:solidFill>
-                      <a:schemeClr val="bg1">
-                        <a:alpha val="40000"/>
-                      </a:schemeClr>
-                    </a:solidFill>
-                  </a:tcPr>
-                </a:tc>
-                <a:extLst>
-                  <a:ext uri="{0D108BD9-81ED-4DB2-BD59-A6C34878D82A}">
-                    <a16:rowId xmlns:a16="http://schemas.microsoft.com/office/drawing/2014/main" val="380950325"/>
-                  </a:ext>
-                </a:extLst>
-              </a:tr>
-            </a:tbl>
-          </a:graphicData>
-        </a:graphic>
-      </p:graphicFrame>
-    </p:spTree>
-    <p:extLst>
-      <p:ext uri="{BB962C8B-B14F-4D97-AF65-F5344CB8AC3E}">
-        <p14:creationId xmlns:p14="http://schemas.microsoft.com/office/powerpoint/2010/main" val="1208724409"/>
-      </p:ext>
-    </p:extLst>
-  </p:cSld>
-  <p:clrMapOvr>
-    <a:masterClrMapping/>
-  </p:clrMapOvr>
-</p:sld>
-</file>
-
-<file path=ppt/slides/slide11.xml><?xml version="1.0" encoding="utf-8"?>
-<p:sld xmlns:a="http://schemas.openxmlformats.org/drawingml/2006/main" xmlns:r="http://schemas.openxmlformats.org/officeDocument/2006/relationships" xmlns:p="http://schemas.openxmlformats.org/presentationml/2006/main">
-  <p:cSld>
-    <p:spTree>
-      <p:nvGrpSpPr>
-        <p:cNvPr id="1" name=""/>
-        <p:cNvGrpSpPr/>
-        <p:nvPr/>
-      </p:nvGrpSpPr>
-      <p:grpSpPr>
-        <a:xfrm>
-          <a:off x="0" y="0"/>
-          <a:ext cx="0" cy="0"/>
-          <a:chOff x="0" y="0"/>
-          <a:chExt cx="0" cy="0"/>
-        </a:xfrm>
-      </p:grpSpPr>
-      <p:sp>
-        <p:nvSpPr>
-          <p:cNvPr id="2" name="Title 1">
-            <a:extLst>
-              <a:ext uri="{FF2B5EF4-FFF2-40B4-BE49-F238E27FC236}">
-                <a16:creationId xmlns:a16="http://schemas.microsoft.com/office/drawing/2014/main" id="{48C5BC92-868A-26B2-CBC0-C9D94E65F1A4}"/>
-              </a:ext>
-            </a:extLst>
-          </p:cNvPr>
-          <p:cNvSpPr>
-            <a:spLocks noGrp="1"/>
-          </p:cNvSpPr>
-          <p:nvPr>
-            <p:ph type="ctrTitle"/>
-          </p:nvPr>
-        </p:nvSpPr>
-        <p:spPr/>
-        <p:txBody>
-          <a:bodyPr/>
-          <a:lstStyle/>
-          <a:p>
-            <a:r>
-              <a:rPr lang="en-US" sz="4000" b="1" spc="600" dirty="0">
-                <a:ln w="28575">
-                  <a:noFill/>
-                  <a:prstDash val="solid"/>
-                </a:ln>
-                <a:solidFill>
-                  <a:schemeClr val="bg1"/>
-                </a:solidFill>
-                <a:latin typeface="Tw Cen MT" panose="020B0602020104020603" pitchFamily="34" charset="77"/>
-                <a:ea typeface="Verdana" panose="020B0604030504040204" pitchFamily="34" charset="0"/>
-                <a:cs typeface="Verdana" panose="020B0604030504040204" pitchFamily="34" charset="0"/>
-              </a:rPr>
-              <a:t>SUMMARY</a:t>
-            </a:r>
-            <a:endParaRPr lang="en-US" dirty="0"/>
-          </a:p>
-        </p:txBody>
-      </p:sp>
-      <p:sp>
-        <p:nvSpPr>
-          <p:cNvPr id="3" name="Subtitle 2">
-            <a:extLst>
-              <a:ext uri="{FF2B5EF4-FFF2-40B4-BE49-F238E27FC236}">
-                <a16:creationId xmlns:a16="http://schemas.microsoft.com/office/drawing/2014/main" id="{6F9C1627-7A56-025E-482D-E2AB014EDF92}"/>
-              </a:ext>
-            </a:extLst>
-          </p:cNvPr>
-          <p:cNvSpPr>
-            <a:spLocks noGrp="1"/>
-          </p:cNvSpPr>
-          <p:nvPr>
-            <p:ph type="subTitle" idx="1"/>
-          </p:nvPr>
-        </p:nvSpPr>
-        <p:spPr/>
-        <p:txBody>
-          <a:bodyPr/>
-          <a:lstStyle/>
-          <a:p>
-            <a:r>
-              <a:rPr lang="en-US" sz="1800" dirty="0">
-                <a:solidFill>
-                  <a:schemeClr val="bg1"/>
-                </a:solidFill>
-                <a:latin typeface="Segoe UI Light" panose="020B0502040204020203" pitchFamily="34" charset="0"/>
-                <a:ea typeface="+mn-lt"/>
-                <a:cs typeface="Segoe UI Light" panose="020B0502040204020203" pitchFamily="34" charset="0"/>
-              </a:rPr>
-              <a:t>At Krypto Logics, we believe in giving 110%. By using our next-generation data architecture, we help investors virtually manage their portfolios. We thrive because of our market knowledge and great team. As our CEO says, "Efficiencies will come from proactively transforming how we do business."</a:t>
-            </a:r>
-          </a:p>
-          <a:p>
-            <a:endParaRPr lang="en-US" dirty="0"/>
-          </a:p>
-        </p:txBody>
-      </p:sp>
-    </p:spTree>
-    <p:extLst>
-      <p:ext uri="{BB962C8B-B14F-4D97-AF65-F5344CB8AC3E}">
-        <p14:creationId xmlns:p14="http://schemas.microsoft.com/office/powerpoint/2010/main" val="1958759625"/>
-      </p:ext>
-    </p:extLst>
-  </p:cSld>
-  <p:clrMapOvr>
-    <a:masterClrMapping/>
-  </p:clrMapOvr>
-</p:sld>
-</file>
-
-<file path=ppt/slides/slide12.xml><?xml version="1.0" encoding="utf-8"?>
-<p:sld xmlns:a="http://schemas.openxmlformats.org/drawingml/2006/main" xmlns:r="http://schemas.openxmlformats.org/officeDocument/2006/relationships" xmlns:p="http://schemas.openxmlformats.org/presentationml/2006/main">
-  <p:cSld>
-    <p:spTree>
-      <p:nvGrpSpPr>
-        <p:cNvPr id="1" name=""/>
-        <p:cNvGrpSpPr/>
-        <p:nvPr/>
-      </p:nvGrpSpPr>
-      <p:grpSpPr>
-        <a:xfrm>
-          <a:off x="0" y="0"/>
-          <a:ext cx="0" cy="0"/>
-          <a:chOff x="0" y="0"/>
-          <a:chExt cx="0" cy="0"/>
-        </a:xfrm>
-      </p:grpSpPr>
-      <p:sp>
-        <p:nvSpPr>
-          <p:cNvPr id="2" name="Title 1">
-            <a:extLst>
-              <a:ext uri="{FF2B5EF4-FFF2-40B4-BE49-F238E27FC236}">
                 <a16:creationId xmlns:a16="http://schemas.microsoft.com/office/drawing/2014/main" id="{2C9E1892-81E6-551C-7B5A-DEA68224520B}"/>
               </a:ext>
             </a:extLst>
@@ -22380,7 +18867,7 @@
           <p:cNvPr id="2" name="Title 1">
             <a:extLst>
               <a:ext uri="{FF2B5EF4-FFF2-40B4-BE49-F238E27FC236}">
-                <a16:creationId xmlns:a16="http://schemas.microsoft.com/office/drawing/2014/main" id="{C8152FE8-2F9C-9C12-4EB3-9742EA91D653}"/>
+                <a16:creationId xmlns:a16="http://schemas.microsoft.com/office/drawing/2014/main" id="{48C5BC92-868A-26B2-CBC0-C9D94E65F1A4}"/>
               </a:ext>
             </a:extLst>
           </p:cNvPr>
@@ -22388,7 +18875,7 @@
             <a:spLocks noGrp="1"/>
           </p:cNvSpPr>
           <p:nvPr>
-            <p:ph type="title"/>
+            <p:ph type="ctrTitle"/>
           </p:nvPr>
         </p:nvSpPr>
         <p:spPr/>
@@ -22406,18 +18893,21 @@
                   <a:schemeClr val="bg1"/>
                 </a:solidFill>
                 <a:latin typeface="Tw Cen MT" panose="020B0602020104020603" pitchFamily="34" charset="77"/>
+                <a:ea typeface="Verdana" panose="020B0604030504040204" pitchFamily="34" charset="0"/>
+                <a:cs typeface="Verdana" panose="020B0604030504040204" pitchFamily="34" charset="0"/>
               </a:rPr>
-              <a:t>LONG-TERM VS. SHORT-TERM</a:t>
-            </a:r>
-          </a:p>
-        </p:txBody>
-      </p:sp>
-      <p:sp>
-        <p:nvSpPr>
-          <p:cNvPr id="5" name="Slide Number Placeholder 4">
-            <a:extLst>
-              <a:ext uri="{FF2B5EF4-FFF2-40B4-BE49-F238E27FC236}">
-                <a16:creationId xmlns:a16="http://schemas.microsoft.com/office/drawing/2014/main" id="{2A8E318B-D756-6C57-8657-96C836320839}"/>
+              <a:t>SUMMARY</a:t>
+            </a:r>
+            <a:endParaRPr lang="en-US" dirty="0"/>
+          </a:p>
+        </p:txBody>
+      </p:sp>
+      <p:sp>
+        <p:nvSpPr>
+          <p:cNvPr id="3" name="Subtitle 2">
+            <a:extLst>
+              <a:ext uri="{FF2B5EF4-FFF2-40B4-BE49-F238E27FC236}">
+                <a16:creationId xmlns:a16="http://schemas.microsoft.com/office/drawing/2014/main" id="{6F9C1627-7A56-025E-482D-E2AB014EDF92}"/>
               </a:ext>
             </a:extLst>
           </p:cNvPr>
@@ -22425,7 +18915,7 @@
             <a:spLocks noGrp="1"/>
           </p:cNvSpPr>
           <p:nvPr>
-            <p:ph type="sldNum" sz="quarter" idx="11"/>
+            <p:ph type="subTitle" idx="1"/>
           </p:nvPr>
         </p:nvSpPr>
         <p:spPr/>
@@ -22433,50 +18923,27 @@
           <a:bodyPr/>
           <a:lstStyle/>
           <a:p>
-            <a:fld id="{294A09A9-5501-47C1-A89A-A340965A2BE2}" type="slidenum">
-              <a:rPr lang="en-US" smtClean="0"/>
-              <a:pPr/>
-              <a:t>9</a:t>
-            </a:fld>
+            <a:r>
+              <a:rPr lang="en-US" sz="1800" dirty="0">
+                <a:solidFill>
+                  <a:schemeClr val="bg1"/>
+                </a:solidFill>
+                <a:latin typeface="Segoe UI Light" panose="020B0502040204020203" pitchFamily="34" charset="0"/>
+                <a:ea typeface="+mn-lt"/>
+                <a:cs typeface="Segoe UI Light" panose="020B0502040204020203" pitchFamily="34" charset="0"/>
+              </a:rPr>
+              <a:t>At Krypto Logics, we believe in giving 110%. By using our next-generation data architecture, we help investors virtually manage their portfolios. We thrive because of our market knowledge and great team. As our CEO says, "Efficiencies will come from proactively transforming how we do business."</a:t>
+            </a:r>
+          </a:p>
+          <a:p>
             <a:endParaRPr lang="en-US" dirty="0"/>
           </a:p>
         </p:txBody>
       </p:sp>
-      <p:graphicFrame>
-        <p:nvGraphicFramePr>
-          <p:cNvPr id="4" name="Content Placeholder 5" descr="Bar chart">
-            <a:extLst>
-              <a:ext uri="{FF2B5EF4-FFF2-40B4-BE49-F238E27FC236}">
-                <a16:creationId xmlns:a16="http://schemas.microsoft.com/office/drawing/2014/main" id="{9F02851F-DB0A-09AB-B52A-BE347DDCBD1D}"/>
-              </a:ext>
-            </a:extLst>
-          </p:cNvPr>
-          <p:cNvGraphicFramePr>
-            <a:graphicFrameLocks noGrp="1"/>
-          </p:cNvGraphicFramePr>
-          <p:nvPr>
-            <p:ph idx="1"/>
-            <p:extLst>
-              <p:ext uri="{D42A27DB-BD31-4B8C-83A1-F6EECF244321}">
-                <p14:modId xmlns:p14="http://schemas.microsoft.com/office/powerpoint/2010/main" val="1861876390"/>
-              </p:ext>
-            </p:extLst>
-          </p:nvPr>
-        </p:nvGraphicFramePr>
-        <p:xfrm>
-          <a:off x="1014413" y="2212975"/>
-          <a:ext cx="10333037" cy="3548063"/>
-        </p:xfrm>
-        <a:graphic>
-          <a:graphicData uri="http://schemas.openxmlformats.org/drawingml/2006/chart">
-            <c:chart xmlns:c="http://schemas.openxmlformats.org/drawingml/2006/chart" xmlns:r="http://schemas.openxmlformats.org/officeDocument/2006/relationships" r:id="rId2"/>
-          </a:graphicData>
-        </a:graphic>
-      </p:graphicFrame>
     </p:spTree>
     <p:extLst>
       <p:ext uri="{BB962C8B-B14F-4D97-AF65-F5344CB8AC3E}">
-        <p14:creationId xmlns:p14="http://schemas.microsoft.com/office/powerpoint/2010/main" val="1372651910"/>
+        <p14:creationId xmlns:p14="http://schemas.microsoft.com/office/powerpoint/2010/main" val="1958759625"/>
       </p:ext>
     </p:extLst>
   </p:cSld>
@@ -23298,6 +19765,35 @@
 </file>
 
 <file path=customXml/item1.xml><?xml version="1.0" encoding="utf-8"?>
+<?mso-contentType ?>
+<FormTemplates xmlns="http://schemas.microsoft.com/sharepoint/v3/contenttype/forms">
+  <Display>DocumentLibraryForm</Display>
+  <Edit>DocumentLibraryForm</Edit>
+  <New>DocumentLibraryForm</New>
+</FormTemplates>
+</file>
+
+<file path=customXml/item2.xml><?xml version="1.0" encoding="utf-8"?>
+<p:properties xmlns:p="http://schemas.microsoft.com/office/2006/metadata/properties" xmlns:xsi="http://www.w3.org/2001/XMLSchema-instance" xmlns:pc="http://schemas.microsoft.com/office/infopath/2007/PartnerControls">
+  <documentManagement>
+    <_ip_UnifiedCompliancePolicyUIAction xmlns="http://schemas.microsoft.com/sharepoint/v3" xsi:nil="true"/>
+    <Image xmlns="71af3243-3dd4-4a8d-8c0d-dd76da1f02a5">
+      <Url xsi:nil="true"/>
+      <Description xsi:nil="true"/>
+    </Image>
+    <Status xmlns="71af3243-3dd4-4a8d-8c0d-dd76da1f02a5">Not started</Status>
+    <Background xmlns="71af3243-3dd4-4a8d-8c0d-dd76da1f02a5">false</Background>
+    <_ip_UnifiedCompliancePolicyProperties xmlns="http://schemas.microsoft.com/sharepoint/v3" xsi:nil="true"/>
+    <ImageTagsTaxHTField xmlns="71af3243-3dd4-4a8d-8c0d-dd76da1f02a5">
+      <Terms xmlns="http://schemas.microsoft.com/office/infopath/2007/PartnerControls"/>
+    </ImageTagsTaxHTField>
+    <TaxCatchAll xmlns="230e9df3-be65-4c73-a93b-d1236ebd677e" xsi:nil="true"/>
+    <MediaServiceKeyPoints xmlns="71af3243-3dd4-4a8d-8c0d-dd76da1f02a5" xsi:nil="true"/>
+  </documentManagement>
+</p:properties>
+</file>
+
+<file path=customXml/item3.xml><?xml version="1.0" encoding="utf-8"?>
 <ct:contentTypeSchema xmlns:ct="http://schemas.microsoft.com/office/2006/metadata/contentType" xmlns:ma="http://schemas.microsoft.com/office/2006/metadata/properties/metaAttributes" ct:_="" ma:_="" ma:contentTypeName="Document" ma:contentTypeID="0x01010079F111ED35F8CC479449609E8A0923A6" ma:contentTypeVersion="25" ma:contentTypeDescription="Create a new document." ma:contentTypeScope="" ma:versionID="e02306daf00165b375dc6a58966960be">
   <xsd:schema xmlns:xsd="http://www.w3.org/2001/XMLSchema" xmlns:xs="http://www.w3.org/2001/XMLSchema" xmlns:p="http://schemas.microsoft.com/office/2006/metadata/properties" xmlns:ns1="http://schemas.microsoft.com/sharepoint/v3" xmlns:ns2="71af3243-3dd4-4a8d-8c0d-dd76da1f02a5" xmlns:ns3="16c05727-aa75-4e4a-9b5f-8a80a1165891" xmlns:ns4="230e9df3-be65-4c73-a93b-d1236ebd677e" targetNamespace="http://schemas.microsoft.com/office/2006/metadata/properties" ma:root="true" ma:fieldsID="df88fb76bf5f555224557953949c1ec9" ns1:_="" ns2:_="" ns3:_="" ns4:_="">
     <xsd:import namespace="http://schemas.microsoft.com/sharepoint/v3"/>
@@ -23591,36 +20087,27 @@
 </ct:contentTypeSchema>
 </file>
 
-<file path=customXml/item2.xml><?xml version="1.0" encoding="utf-8"?>
-<p:properties xmlns:p="http://schemas.microsoft.com/office/2006/metadata/properties" xmlns:xsi="http://www.w3.org/2001/XMLSchema-instance" xmlns:pc="http://schemas.microsoft.com/office/infopath/2007/PartnerControls">
-  <documentManagement>
-    <_ip_UnifiedCompliancePolicyUIAction xmlns="http://schemas.microsoft.com/sharepoint/v3" xsi:nil="true"/>
-    <Image xmlns="71af3243-3dd4-4a8d-8c0d-dd76da1f02a5">
-      <Url xsi:nil="true"/>
-      <Description xsi:nil="true"/>
-    </Image>
-    <Status xmlns="71af3243-3dd4-4a8d-8c0d-dd76da1f02a5">Not started</Status>
-    <Background xmlns="71af3243-3dd4-4a8d-8c0d-dd76da1f02a5">false</Background>
-    <_ip_UnifiedCompliancePolicyProperties xmlns="http://schemas.microsoft.com/sharepoint/v3" xsi:nil="true"/>
-    <ImageTagsTaxHTField xmlns="71af3243-3dd4-4a8d-8c0d-dd76da1f02a5">
-      <Terms xmlns="http://schemas.microsoft.com/office/infopath/2007/PartnerControls"/>
-    </ImageTagsTaxHTField>
-    <TaxCatchAll xmlns="230e9df3-be65-4c73-a93b-d1236ebd677e" xsi:nil="true"/>
-    <MediaServiceKeyPoints xmlns="71af3243-3dd4-4a8d-8c0d-dd76da1f02a5" xsi:nil="true"/>
-  </documentManagement>
-</p:properties>
+<file path=customXml/itemProps1.xml><?xml version="1.0" encoding="utf-8"?>
+<ds:datastoreItem xmlns:ds="http://schemas.openxmlformats.org/officeDocument/2006/customXml" ds:itemID="{4F1F1912-3146-44AF-A389-9E8B77BB3688}">
+  <ds:schemaRefs>
+    <ds:schemaRef ds:uri="http://schemas.microsoft.com/sharepoint/v3/contenttype/forms"/>
+  </ds:schemaRefs>
+</ds:datastoreItem>
 </file>
 
-<file path=customXml/item3.xml><?xml version="1.0" encoding="utf-8"?>
-<?mso-contentType ?>
-<FormTemplates xmlns="http://schemas.microsoft.com/sharepoint/v3/contenttype/forms">
-  <Display>DocumentLibraryForm</Display>
-  <Edit>DocumentLibraryForm</Edit>
-  <New>DocumentLibraryForm</New>
-</FormTemplates>
+<file path=customXml/itemProps2.xml><?xml version="1.0" encoding="utf-8"?>
+<ds:datastoreItem xmlns:ds="http://schemas.openxmlformats.org/officeDocument/2006/customXml" ds:itemID="{F8B8ECF1-2A9D-464C-AFE8-2B3295D0BF97}">
+  <ds:schemaRefs>
+    <ds:schemaRef ds:uri="http://schemas.microsoft.com/office/2006/metadata/properties"/>
+    <ds:schemaRef ds:uri="http://schemas.microsoft.com/office/infopath/2007/PartnerControls"/>
+    <ds:schemaRef ds:uri="http://schemas.microsoft.com/sharepoint/v3"/>
+    <ds:schemaRef ds:uri="71af3243-3dd4-4a8d-8c0d-dd76da1f02a5"/>
+    <ds:schemaRef ds:uri="230e9df3-be65-4c73-a93b-d1236ebd677e"/>
+  </ds:schemaRefs>
+</ds:datastoreItem>
 </file>
 
-<file path=customXml/itemProps1.xml><?xml version="1.0" encoding="utf-8"?>
+<file path=customXml/itemProps3.xml><?xml version="1.0" encoding="utf-8"?>
 <ds:datastoreItem xmlns:ds="http://schemas.openxmlformats.org/officeDocument/2006/customXml" ds:itemID="{176493A3-2B83-4E58-86AD-56A2F2A20F12}">
   <ds:schemaRefs>
     <ds:schemaRef ds:uri="http://schemas.microsoft.com/office/2006/metadata/contentType"/>
@@ -23641,26 +20128,6 @@
 </ds:datastoreItem>
 </file>
 
-<file path=customXml/itemProps2.xml><?xml version="1.0" encoding="utf-8"?>
-<ds:datastoreItem xmlns:ds="http://schemas.openxmlformats.org/officeDocument/2006/customXml" ds:itemID="{F8B8ECF1-2A9D-464C-AFE8-2B3295D0BF97}">
-  <ds:schemaRefs>
-    <ds:schemaRef ds:uri="http://schemas.microsoft.com/office/2006/metadata/properties"/>
-    <ds:schemaRef ds:uri="http://schemas.microsoft.com/office/infopath/2007/PartnerControls"/>
-    <ds:schemaRef ds:uri="http://schemas.microsoft.com/sharepoint/v3"/>
-    <ds:schemaRef ds:uri="71af3243-3dd4-4a8d-8c0d-dd76da1f02a5"/>
-    <ds:schemaRef ds:uri="230e9df3-be65-4c73-a93b-d1236ebd677e"/>
-  </ds:schemaRefs>
-</ds:datastoreItem>
-</file>
-
-<file path=customXml/itemProps3.xml><?xml version="1.0" encoding="utf-8"?>
-<ds:datastoreItem xmlns:ds="http://schemas.openxmlformats.org/officeDocument/2006/customXml" ds:itemID="{4F1F1912-3146-44AF-A389-9E8B77BB3688}">
-  <ds:schemaRefs>
-    <ds:schemaRef ds:uri="http://schemas.microsoft.com/sharepoint/v3/contenttype/forms"/>
-  </ds:schemaRefs>
-</ds:datastoreItem>
-</file>
-
 <file path=docMetadata/LabelInfo.xml><?xml version="1.0" encoding="utf-8"?>
 <clbl:labelList xmlns:clbl="http://schemas.microsoft.com/office/2020/mipLabelMetadata"/>
 </file>
</xml_diff>